<commit_message>
add mystrfunc.h for 2nd time homework
</commit_message>
<xml_diff>
--- a/slide/C Programming Language 02.pptx
+++ b/slide/C Programming Language 02.pptx
@@ -5415,13 +5415,13 @@
   <p:clrMapOvr>
     <a:masterClrMapping/>
   </p:clrMapOvr>
-  <mc:AlternateContent xmlns:mc="http://schemas.openxmlformats.org/markup-compatibility/2006">
-    <mc:Choice xmlns:p14="http://schemas.microsoft.com/office/powerpoint/2010/main" Requires="p14">
+  <mc:AlternateContent xmlns:mc="http://schemas.openxmlformats.org/markup-compatibility/2006" xmlns:p14="http://schemas.microsoft.com/office/powerpoint/2010/main">
+    <mc:Choice Requires="p14">
       <p:transition spd="med" p14:dur="700">
         <p:fade/>
       </p:transition>
     </mc:Choice>
-    <mc:Fallback>
+    <mc:Fallback xmlns="">
       <p:transition spd="med">
         <p:fade/>
       </p:transition>
@@ -5504,7 +5504,6 @@
               <a:rPr lang="en-US" altLang="zh-CN" dirty="0" smtClean="0"/>
               <a:t>C FILE I/O </a:t>
             </a:r>
-            <a:endParaRPr lang="en-US" altLang="zh-CN" dirty="0" smtClean="0"/>
           </a:p>
           <a:p>
             <a:r>
@@ -6067,13 +6066,13 @@
   <p:clrMapOvr>
     <a:masterClrMapping/>
   </p:clrMapOvr>
-  <mc:AlternateContent xmlns:mc="http://schemas.openxmlformats.org/markup-compatibility/2006">
-    <mc:Choice xmlns:p14="http://schemas.microsoft.com/office/powerpoint/2010/main" Requires="p14">
+  <mc:AlternateContent xmlns:mc="http://schemas.openxmlformats.org/markup-compatibility/2006" xmlns:p14="http://schemas.microsoft.com/office/powerpoint/2010/main">
+    <mc:Choice Requires="p14">
       <p:transition spd="med" p14:dur="700">
         <p:fade/>
       </p:transition>
     </mc:Choice>
-    <mc:Fallback>
+    <mc:Fallback xmlns="">
       <p:transition spd="med">
         <p:fade/>
       </p:transition>
@@ -6513,13 +6512,13 @@
   <p:clrMapOvr>
     <a:masterClrMapping/>
   </p:clrMapOvr>
-  <mc:AlternateContent xmlns:mc="http://schemas.openxmlformats.org/markup-compatibility/2006">
-    <mc:Choice xmlns:p14="http://schemas.microsoft.com/office/powerpoint/2010/main" Requires="p14">
+  <mc:AlternateContent xmlns:mc="http://schemas.openxmlformats.org/markup-compatibility/2006" xmlns:p14="http://schemas.microsoft.com/office/powerpoint/2010/main">
+    <mc:Choice Requires="p14">
       <p:transition spd="med" p14:dur="700">
         <p:fade/>
       </p:transition>
     </mc:Choice>
-    <mc:Fallback>
+    <mc:Fallback xmlns="">
       <p:transition spd="med">
         <p:fade/>
       </p:transition>
@@ -6757,13 +6756,13 @@
   <p:clrMapOvr>
     <a:masterClrMapping/>
   </p:clrMapOvr>
-  <mc:AlternateContent xmlns:mc="http://schemas.openxmlformats.org/markup-compatibility/2006">
-    <mc:Choice xmlns:p14="http://schemas.microsoft.com/office/powerpoint/2010/main" Requires="p14">
+  <mc:AlternateContent xmlns:mc="http://schemas.openxmlformats.org/markup-compatibility/2006" xmlns:p14="http://schemas.microsoft.com/office/powerpoint/2010/main">
+    <mc:Choice Requires="p14">
       <p:transition spd="med" p14:dur="700">
         <p:fade/>
       </p:transition>
     </mc:Choice>
-    <mc:Fallback>
+    <mc:Fallback xmlns="">
       <p:transition spd="med">
         <p:fade/>
       </p:transition>
@@ -6880,13 +6879,13 @@
   <p:clrMapOvr>
     <a:masterClrMapping/>
   </p:clrMapOvr>
-  <mc:AlternateContent xmlns:mc="http://schemas.openxmlformats.org/markup-compatibility/2006">
-    <mc:Choice xmlns:p14="http://schemas.microsoft.com/office/powerpoint/2010/main" Requires="p14">
+  <mc:AlternateContent xmlns:mc="http://schemas.openxmlformats.org/markup-compatibility/2006" xmlns:p14="http://schemas.microsoft.com/office/powerpoint/2010/main">
+    <mc:Choice Requires="p14">
       <p:transition spd="med" p14:dur="700">
         <p:fade/>
       </p:transition>
     </mc:Choice>
-    <mc:Fallback>
+    <mc:Fallback xmlns="">
       <p:transition spd="med">
         <p:fade/>
       </p:transition>
@@ -7235,13 +7234,13 @@
   <p:clrMapOvr>
     <a:masterClrMapping/>
   </p:clrMapOvr>
-  <mc:AlternateContent xmlns:mc="http://schemas.openxmlformats.org/markup-compatibility/2006">
-    <mc:Choice xmlns:p14="http://schemas.microsoft.com/office/powerpoint/2010/main" Requires="p14">
+  <mc:AlternateContent xmlns:mc="http://schemas.openxmlformats.org/markup-compatibility/2006" xmlns:p14="http://schemas.microsoft.com/office/powerpoint/2010/main">
+    <mc:Choice Requires="p14">
       <p:transition spd="med" p14:dur="700">
         <p:fade/>
       </p:transition>
     </mc:Choice>
-    <mc:Fallback>
+    <mc:Fallback xmlns="">
       <p:transition spd="med">
         <p:fade/>
       </p:transition>
@@ -8266,13 +8265,13 @@
   <p:clrMapOvr>
     <a:masterClrMapping/>
   </p:clrMapOvr>
-  <mc:AlternateContent xmlns:mc="http://schemas.openxmlformats.org/markup-compatibility/2006">
-    <mc:Choice xmlns:p14="http://schemas.microsoft.com/office/powerpoint/2010/main" Requires="p14">
+  <mc:AlternateContent xmlns:mc="http://schemas.openxmlformats.org/markup-compatibility/2006" xmlns:p14="http://schemas.microsoft.com/office/powerpoint/2010/main">
+    <mc:Choice Requires="p14">
       <p:transition spd="med" p14:dur="700">
         <p:fade/>
       </p:transition>
     </mc:Choice>
-    <mc:Fallback>
+    <mc:Fallback xmlns="">
       <p:transition spd="med">
         <p:fade/>
       </p:transition>
@@ -8403,11 +8402,7 @@
             </a:r>
             <a:r>
               <a:rPr lang="en-US" altLang="zh-CN" dirty="0"/>
-              <a:t> </a:t>
-            </a:r>
-            <a:r>
-              <a:rPr lang="en-US" altLang="zh-CN" dirty="0"/>
-              <a:t>cipher(</a:t>
+              <a:t> cipher(</a:t>
             </a:r>
             <a:r>
               <a:rPr lang="en-US" altLang="zh-CN" dirty="0">
@@ -8423,7 +8418,15 @@
             </a:r>
             <a:r>
               <a:rPr lang="en-US" altLang="zh-CN" dirty="0" smtClean="0"/>
-              <a:t>) is more complex and hard to hack. If you are interested, program it. </a:t>
+              <a:t>) </a:t>
+            </a:r>
+            <a:r>
+              <a:rPr lang="en-US" altLang="zh-CN" dirty="0" smtClean="0"/>
+              <a:t>based on Caesar cipher is </a:t>
+            </a:r>
+            <a:r>
+              <a:rPr lang="en-US" altLang="zh-CN" dirty="0" smtClean="0"/>
+              <a:t>more complex and hard to hack. If you are interested, program it. </a:t>
             </a:r>
             <a:endParaRPr lang="en-US" altLang="zh-CN" dirty="0"/>
           </a:p>
@@ -8676,13 +8679,13 @@
   <p:clrMapOvr>
     <a:masterClrMapping/>
   </p:clrMapOvr>
-  <mc:AlternateContent xmlns:mc="http://schemas.openxmlformats.org/markup-compatibility/2006">
-    <mc:Choice xmlns:p14="http://schemas.microsoft.com/office/powerpoint/2010/main" Requires="p14">
+  <mc:AlternateContent xmlns:mc="http://schemas.openxmlformats.org/markup-compatibility/2006" xmlns:p14="http://schemas.microsoft.com/office/powerpoint/2010/main">
+    <mc:Choice Requires="p14">
       <p:transition spd="med" p14:dur="700">
         <p:fade/>
       </p:transition>
     </mc:Choice>
-    <mc:Fallback>
+    <mc:Fallback xmlns="">
       <p:transition spd="med">
         <p:fade/>
       </p:transition>

</xml_diff>

<commit_message>
add binary file operation
</commit_message>
<xml_diff>
--- a/slide/C Programming Language 02.pptx
+++ b/slide/C Programming Language 02.pptx
@@ -5,10 +5,10 @@
     <p:sldMasterId id="2147483660" r:id="rId2"/>
   </p:sldMasterIdLst>
   <p:notesMasterIdLst>
-    <p:notesMasterId r:id="rId13"/>
+    <p:notesMasterId r:id="rId15"/>
   </p:notesMasterIdLst>
   <p:handoutMasterIdLst>
-    <p:handoutMasterId r:id="rId14"/>
+    <p:handoutMasterId r:id="rId16"/>
   </p:handoutMasterIdLst>
   <p:sldIdLst>
     <p:sldId id="257" r:id="rId3"/>
@@ -16,11 +16,13 @@
     <p:sldId id="294" r:id="rId5"/>
     <p:sldId id="295" r:id="rId6"/>
     <p:sldId id="296" r:id="rId7"/>
-    <p:sldId id="297" r:id="rId8"/>
-    <p:sldId id="298" r:id="rId9"/>
-    <p:sldId id="299" r:id="rId10"/>
-    <p:sldId id="300" r:id="rId11"/>
-    <p:sldId id="301" r:id="rId12"/>
+    <p:sldId id="303" r:id="rId8"/>
+    <p:sldId id="297" r:id="rId9"/>
+    <p:sldId id="302" r:id="rId10"/>
+    <p:sldId id="298" r:id="rId11"/>
+    <p:sldId id="299" r:id="rId12"/>
+    <p:sldId id="300" r:id="rId13"/>
+    <p:sldId id="301" r:id="rId14"/>
   </p:sldIdLst>
   <p:sldSz cx="12188825" cy="6858000"/>
   <p:notesSz cx="6858000" cy="9144000"/>
@@ -129,7 +131,9 @@
             <p14:sldId id="294"/>
             <p14:sldId id="295"/>
             <p14:sldId id="296"/>
+            <p14:sldId id="303"/>
             <p14:sldId id="297"/>
+            <p14:sldId id="302"/>
             <p14:sldId id="298"/>
             <p14:sldId id="299"/>
             <p14:sldId id="300"/>
@@ -277,7 +281,7 @@
           <a:p>
             <a:fld id="{FE5B4EDC-59C0-49C7-8ADA-5A781B329E02}" type="datetimeFigureOut">
               <a:rPr lang="en-US" altLang="zh-CN"/>
-              <a:t>12/29/2014</a:t>
+              <a:t>12/31/2014</a:t>
             </a:fld>
             <a:endParaRPr lang="zh-CN"/>
           </a:p>
@@ -441,7 +445,7 @@
           </a:lstStyle>
           <a:p>
             <a:fld id="{F2D8D46A-B586-417D-BFBD-8C8FE0AAF762}" type="datetimeFigureOut">
-              <a:t>2014/12/29</a:t>
+              <a:t>2014/12/31</a:t>
             </a:fld>
             <a:endParaRPr lang="zh-CN"/>
           </a:p>
@@ -1462,7 +1466,7 @@
           <a:lstStyle/>
           <a:p>
             <a:fld id="{F0DFD029-FB74-4578-B929-F66AA97659CA}" type="datetimeFigureOut">
-              <a:t>2014/12/29</a:t>
+              <a:t>2014/12/31</a:t>
             </a:fld>
             <a:endParaRPr lang="zh-CN"/>
           </a:p>
@@ -1665,7 +1669,7 @@
           <a:lstStyle/>
           <a:p>
             <a:fld id="{F0DFD029-FB74-4578-B929-F66AA97659CA}" type="datetimeFigureOut">
-              <a:t>2014/12/29</a:t>
+              <a:t>2014/12/31</a:t>
             </a:fld>
             <a:endParaRPr lang="zh-CN"/>
           </a:p>
@@ -1878,7 +1882,7 @@
           <a:lstStyle/>
           <a:p>
             <a:fld id="{F0DFD029-FB74-4578-B929-F66AA97659CA}" type="datetimeFigureOut">
-              <a:t>2014/12/29</a:t>
+              <a:t>2014/12/31</a:t>
             </a:fld>
             <a:endParaRPr lang="zh-CN"/>
           </a:p>
@@ -2081,7 +2085,7 @@
           <a:lstStyle/>
           <a:p>
             <a:fld id="{F0DFD029-FB74-4578-B929-F66AA97659CA}" type="datetimeFigureOut">
-              <a:t>2014/12/29</a:t>
+              <a:t>2014/12/31</a:t>
             </a:fld>
             <a:endParaRPr lang="zh-CN"/>
           </a:p>
@@ -2349,7 +2353,7 @@
           <a:lstStyle/>
           <a:p>
             <a:fld id="{F0DFD029-FB74-4578-B929-F66AA97659CA}" type="datetimeFigureOut">
-              <a:t>2014/12/29</a:t>
+              <a:t>2014/12/31</a:t>
             </a:fld>
             <a:endParaRPr lang="zh-CN"/>
           </a:p>
@@ -2832,7 +2836,7 @@
           <a:lstStyle/>
           <a:p>
             <a:fld id="{F0DFD029-FB74-4578-B929-F66AA97659CA}" type="datetimeFigureOut">
-              <a:t>2014/12/29</a:t>
+              <a:t>2014/12/31</a:t>
             </a:fld>
             <a:endParaRPr lang="zh-CN"/>
           </a:p>
@@ -3298,7 +3302,7 @@
           <a:lstStyle/>
           <a:p>
             <a:fld id="{F0DFD029-FB74-4578-B929-F66AA97659CA}" type="datetimeFigureOut">
-              <a:t>2014/12/29</a:t>
+              <a:t>2014/12/31</a:t>
             </a:fld>
             <a:endParaRPr lang="zh-CN"/>
           </a:p>
@@ -3433,7 +3437,7 @@
           <a:lstStyle/>
           <a:p>
             <a:fld id="{F0DFD029-FB74-4578-B929-F66AA97659CA}" type="datetimeFigureOut">
-              <a:t>2014/12/29</a:t>
+              <a:t>2014/12/31</a:t>
             </a:fld>
             <a:endParaRPr lang="zh-CN"/>
           </a:p>
@@ -3545,7 +3549,7 @@
           <a:lstStyle/>
           <a:p>
             <a:fld id="{F0DFD029-FB74-4578-B929-F66AA97659CA}" type="datetimeFigureOut">
-              <a:t>2014/12/29</a:t>
+              <a:t>2014/12/31</a:t>
             </a:fld>
             <a:endParaRPr lang="zh-CN"/>
           </a:p>
@@ -3849,7 +3853,7 @@
           <a:lstStyle/>
           <a:p>
             <a:fld id="{F0DFD029-FB74-4578-B929-F66AA97659CA}" type="datetimeFigureOut">
-              <a:t>2014/12/29</a:t>
+              <a:t>2014/12/31</a:t>
             </a:fld>
             <a:endParaRPr lang="zh-CN"/>
           </a:p>
@@ -4142,7 +4146,7 @@
           <a:lstStyle/>
           <a:p>
             <a:fld id="{F0DFD029-FB74-4578-B929-F66AA97659CA}" type="datetimeFigureOut">
-              <a:t>2014/12/29</a:t>
+              <a:t>2014/12/31</a:t>
             </a:fld>
             <a:endParaRPr lang="zh-CN"/>
           </a:p>
@@ -4780,7 +4784,7 @@
             <a:fld id="{F0DFD029-FB74-4578-B929-F66AA97659CA}" type="datetimeFigureOut">
               <a:rPr lang="en-US" altLang="zh-CN" smtClean="0"/>
               <a:pPr/>
-              <a:t>12/29/2014</a:t>
+              <a:t>12/31/2014</a:t>
             </a:fld>
             <a:endParaRPr lang="zh-CN" altLang="en-US"/>
           </a:p>
@@ -5372,6 +5376,1443 @@
           <a:p>
             <a:r>
               <a:rPr lang="en-US" altLang="zh-CN" dirty="0" smtClean="0"/>
+              <a:t>Specify the plaintext file and output file</a:t>
+            </a:r>
+            <a:endParaRPr lang="zh-CN" altLang="en-US" dirty="0"/>
+          </a:p>
+        </p:txBody>
+      </p:sp>
+      <p:sp>
+        <p:nvSpPr>
+          <p:cNvPr id="4" name="矩形 3"/>
+          <p:cNvSpPr/>
+          <p:nvPr/>
+        </p:nvSpPr>
+        <p:spPr>
+          <a:xfrm>
+            <a:off x="1341884" y="1595021"/>
+            <a:ext cx="8447012" cy="5262979"/>
+          </a:xfrm>
+          <a:prstGeom prst="rect">
+            <a:avLst/>
+          </a:prstGeom>
+          <a:solidFill>
+            <a:schemeClr val="bg1">
+              <a:lumMod val="85000"/>
+              <a:lumOff val="15000"/>
+            </a:schemeClr>
+          </a:solidFill>
+        </p:spPr>
+        <p:txBody>
+          <a:bodyPr wrap="square">
+            <a:spAutoFit/>
+          </a:bodyPr>
+          <a:lstStyle/>
+          <a:p>
+            <a:r>
+              <a:rPr lang="en-US" altLang="zh-CN" dirty="0">
+                <a:solidFill>
+                  <a:srgbClr val="93C763"/>
+                </a:solidFill>
+                <a:highlight>
+                  <a:srgbClr val="22282A"/>
+                </a:highlight>
+              </a:rPr>
+              <a:t>int</a:t>
+            </a:r>
+            <a:r>
+              <a:rPr lang="en-US" altLang="zh-CN" dirty="0">
+                <a:solidFill>
+                  <a:srgbClr val="F1F2F3"/>
+                </a:solidFill>
+                <a:highlight>
+                  <a:srgbClr val="22282A"/>
+                </a:highlight>
+              </a:rPr>
+              <a:t> </a:t>
+            </a:r>
+            <a:r>
+              <a:rPr lang="en-US" altLang="zh-CN" dirty="0">
+                <a:solidFill>
+                  <a:srgbClr val="F3F2F5"/>
+                </a:solidFill>
+                <a:highlight>
+                  <a:srgbClr val="22282A"/>
+                </a:highlight>
+              </a:rPr>
+              <a:t>main</a:t>
+            </a:r>
+            <a:r>
+              <a:rPr lang="en-US" altLang="zh-CN" dirty="0">
+                <a:solidFill>
+                  <a:srgbClr val="E8E2B7"/>
+                </a:solidFill>
+                <a:highlight>
+                  <a:srgbClr val="22282A"/>
+                </a:highlight>
+              </a:rPr>
+              <a:t>(</a:t>
+            </a:r>
+            <a:r>
+              <a:rPr lang="en-US" altLang="zh-CN" dirty="0">
+                <a:solidFill>
+                  <a:srgbClr val="93C763"/>
+                </a:solidFill>
+                <a:highlight>
+                  <a:srgbClr val="22282A"/>
+                </a:highlight>
+              </a:rPr>
+              <a:t>int</a:t>
+            </a:r>
+            <a:r>
+              <a:rPr lang="en-US" altLang="zh-CN" dirty="0">
+                <a:solidFill>
+                  <a:srgbClr val="F1F2F3"/>
+                </a:solidFill>
+                <a:highlight>
+                  <a:srgbClr val="22282A"/>
+                </a:highlight>
+              </a:rPr>
+              <a:t> </a:t>
+            </a:r>
+            <a:r>
+              <a:rPr lang="en-US" altLang="zh-CN" dirty="0" err="1">
+                <a:solidFill>
+                  <a:srgbClr val="F3F2F5"/>
+                </a:solidFill>
+                <a:highlight>
+                  <a:srgbClr val="22282A"/>
+                </a:highlight>
+              </a:rPr>
+              <a:t>argc</a:t>
+            </a:r>
+            <a:r>
+              <a:rPr lang="en-US" altLang="zh-CN" dirty="0">
+                <a:solidFill>
+                  <a:srgbClr val="E8E2B7"/>
+                </a:solidFill>
+                <a:highlight>
+                  <a:srgbClr val="22282A"/>
+                </a:highlight>
+              </a:rPr>
+              <a:t>,</a:t>
+            </a:r>
+            <a:r>
+              <a:rPr lang="en-US" altLang="zh-CN" dirty="0">
+                <a:solidFill>
+                  <a:srgbClr val="F1F2F3"/>
+                </a:solidFill>
+                <a:highlight>
+                  <a:srgbClr val="22282A"/>
+                </a:highlight>
+              </a:rPr>
+              <a:t> </a:t>
+            </a:r>
+            <a:r>
+              <a:rPr lang="en-US" altLang="zh-CN" dirty="0">
+                <a:solidFill>
+                  <a:srgbClr val="93C763"/>
+                </a:solidFill>
+                <a:highlight>
+                  <a:srgbClr val="22282A"/>
+                </a:highlight>
+              </a:rPr>
+              <a:t>char</a:t>
+            </a:r>
+            <a:r>
+              <a:rPr lang="en-US" altLang="zh-CN" dirty="0">
+                <a:solidFill>
+                  <a:srgbClr val="E8E2B7"/>
+                </a:solidFill>
+                <a:highlight>
+                  <a:srgbClr val="22282A"/>
+                </a:highlight>
+              </a:rPr>
+              <a:t>*</a:t>
+            </a:r>
+            <a:r>
+              <a:rPr lang="en-US" altLang="zh-CN" dirty="0">
+                <a:solidFill>
+                  <a:srgbClr val="F1F2F3"/>
+                </a:solidFill>
+                <a:highlight>
+                  <a:srgbClr val="22282A"/>
+                </a:highlight>
+              </a:rPr>
+              <a:t> </a:t>
+            </a:r>
+            <a:r>
+              <a:rPr lang="en-US" altLang="zh-CN" dirty="0" err="1">
+                <a:solidFill>
+                  <a:srgbClr val="F3F2F5"/>
+                </a:solidFill>
+                <a:highlight>
+                  <a:srgbClr val="22282A"/>
+                </a:highlight>
+              </a:rPr>
+              <a:t>argv</a:t>
+            </a:r>
+            <a:r>
+              <a:rPr lang="en-US" altLang="zh-CN" dirty="0">
+                <a:solidFill>
+                  <a:srgbClr val="E8E2B7"/>
+                </a:solidFill>
+                <a:highlight>
+                  <a:srgbClr val="22282A"/>
+                </a:highlight>
+              </a:rPr>
+              <a:t>[])</a:t>
+            </a:r>
+          </a:p>
+          <a:p>
+            <a:r>
+              <a:rPr lang="en-US" altLang="zh-CN" dirty="0">
+                <a:solidFill>
+                  <a:srgbClr val="E8E2B7"/>
+                </a:solidFill>
+                <a:highlight>
+                  <a:srgbClr val="22282A"/>
+                </a:highlight>
+              </a:rPr>
+              <a:t>{</a:t>
+            </a:r>
+          </a:p>
+          <a:p>
+            <a:r>
+              <a:rPr lang="en-US" altLang="zh-CN" dirty="0">
+                <a:solidFill>
+                  <a:srgbClr val="F1F2F3"/>
+                </a:solidFill>
+                <a:highlight>
+                  <a:srgbClr val="22282A"/>
+                </a:highlight>
+              </a:rPr>
+              <a:t>	</a:t>
+            </a:r>
+            <a:r>
+              <a:rPr lang="en-US" altLang="zh-CN" dirty="0">
+                <a:solidFill>
+                  <a:srgbClr val="93C763"/>
+                </a:solidFill>
+                <a:highlight>
+                  <a:srgbClr val="22282A"/>
+                </a:highlight>
+              </a:rPr>
+              <a:t>if</a:t>
+            </a:r>
+            <a:r>
+              <a:rPr lang="en-US" altLang="zh-CN" dirty="0">
+                <a:solidFill>
+                  <a:srgbClr val="E8E2B7"/>
+                </a:solidFill>
+                <a:highlight>
+                  <a:srgbClr val="22282A"/>
+                </a:highlight>
+              </a:rPr>
+              <a:t>(</a:t>
+            </a:r>
+            <a:r>
+              <a:rPr lang="en-US" altLang="zh-CN" dirty="0" err="1">
+                <a:solidFill>
+                  <a:srgbClr val="F3F2F5"/>
+                </a:solidFill>
+                <a:highlight>
+                  <a:srgbClr val="22282A"/>
+                </a:highlight>
+              </a:rPr>
+              <a:t>argc</a:t>
+            </a:r>
+            <a:r>
+              <a:rPr lang="en-US" altLang="zh-CN" dirty="0">
+                <a:solidFill>
+                  <a:srgbClr val="F1F2F3"/>
+                </a:solidFill>
+                <a:highlight>
+                  <a:srgbClr val="22282A"/>
+                </a:highlight>
+              </a:rPr>
+              <a:t> </a:t>
+            </a:r>
+            <a:r>
+              <a:rPr lang="en-US" altLang="zh-CN" dirty="0">
+                <a:solidFill>
+                  <a:srgbClr val="E8E2B7"/>
+                </a:solidFill>
+                <a:highlight>
+                  <a:srgbClr val="22282A"/>
+                </a:highlight>
+              </a:rPr>
+              <a:t>!=</a:t>
+            </a:r>
+            <a:r>
+              <a:rPr lang="en-US" altLang="zh-CN" dirty="0">
+                <a:solidFill>
+                  <a:srgbClr val="F1F2F3"/>
+                </a:solidFill>
+                <a:highlight>
+                  <a:srgbClr val="22282A"/>
+                </a:highlight>
+              </a:rPr>
+              <a:t> </a:t>
+            </a:r>
+            <a:r>
+              <a:rPr lang="en-US" altLang="zh-CN" dirty="0">
+                <a:solidFill>
+                  <a:srgbClr val="FFCD22"/>
+                </a:solidFill>
+                <a:highlight>
+                  <a:srgbClr val="22282A"/>
+                </a:highlight>
+              </a:rPr>
+              <a:t>3</a:t>
+            </a:r>
+            <a:r>
+              <a:rPr lang="en-US" altLang="zh-CN" dirty="0">
+                <a:solidFill>
+                  <a:srgbClr val="E8E2B7"/>
+                </a:solidFill>
+                <a:highlight>
+                  <a:srgbClr val="22282A"/>
+                </a:highlight>
+              </a:rPr>
+              <a:t>)</a:t>
+            </a:r>
+          </a:p>
+          <a:p>
+            <a:r>
+              <a:rPr lang="zh-CN" altLang="en-US" dirty="0">
+                <a:solidFill>
+                  <a:srgbClr val="F1F2F3"/>
+                </a:solidFill>
+                <a:highlight>
+                  <a:srgbClr val="22282A"/>
+                </a:highlight>
+              </a:rPr>
+              <a:t>	</a:t>
+            </a:r>
+            <a:r>
+              <a:rPr lang="en-US" altLang="zh-CN" dirty="0">
+                <a:solidFill>
+                  <a:srgbClr val="E8E2B7"/>
+                </a:solidFill>
+                <a:highlight>
+                  <a:srgbClr val="22282A"/>
+                </a:highlight>
+              </a:rPr>
+              <a:t>{</a:t>
+            </a:r>
+          </a:p>
+          <a:p>
+            <a:r>
+              <a:rPr lang="en-US" altLang="zh-CN" dirty="0">
+                <a:solidFill>
+                  <a:srgbClr val="F1F2F3"/>
+                </a:solidFill>
+                <a:highlight>
+                  <a:srgbClr val="22282A"/>
+                </a:highlight>
+              </a:rPr>
+              <a:t>		</a:t>
+            </a:r>
+            <a:r>
+              <a:rPr lang="en-US" altLang="zh-CN" dirty="0" err="1">
+                <a:solidFill>
+                  <a:srgbClr val="F3F2F5"/>
+                </a:solidFill>
+                <a:highlight>
+                  <a:srgbClr val="22282A"/>
+                </a:highlight>
+              </a:rPr>
+              <a:t>printf</a:t>
+            </a:r>
+            <a:r>
+              <a:rPr lang="en-US" altLang="zh-CN" dirty="0">
+                <a:solidFill>
+                  <a:srgbClr val="E8E2B7"/>
+                </a:solidFill>
+                <a:highlight>
+                  <a:srgbClr val="22282A"/>
+                </a:highlight>
+              </a:rPr>
+              <a:t>(</a:t>
+            </a:r>
+            <a:r>
+              <a:rPr lang="en-US" altLang="zh-CN" dirty="0">
+                <a:solidFill>
+                  <a:srgbClr val="EC7600"/>
+                </a:solidFill>
+                <a:highlight>
+                  <a:srgbClr val="22282A"/>
+                </a:highlight>
+              </a:rPr>
+              <a:t>"usage: %s plaintext </a:t>
+            </a:r>
+            <a:r>
+              <a:rPr lang="en-US" altLang="zh-CN" dirty="0" err="1">
+                <a:solidFill>
+                  <a:srgbClr val="EC7600"/>
+                </a:solidFill>
+                <a:highlight>
+                  <a:srgbClr val="22282A"/>
+                </a:highlight>
+              </a:rPr>
+              <a:t>outfile</a:t>
+            </a:r>
+            <a:r>
+              <a:rPr lang="en-US" altLang="zh-CN" dirty="0">
+                <a:solidFill>
+                  <a:srgbClr val="EC7600"/>
+                </a:solidFill>
+                <a:highlight>
+                  <a:srgbClr val="22282A"/>
+                </a:highlight>
+              </a:rPr>
+              <a:t>"</a:t>
+            </a:r>
+            <a:r>
+              <a:rPr lang="en-US" altLang="zh-CN" dirty="0">
+                <a:solidFill>
+                  <a:srgbClr val="E8E2B7"/>
+                </a:solidFill>
+                <a:highlight>
+                  <a:srgbClr val="22282A"/>
+                </a:highlight>
+              </a:rPr>
+              <a:t>,</a:t>
+            </a:r>
+            <a:r>
+              <a:rPr lang="en-US" altLang="zh-CN" dirty="0" err="1">
+                <a:solidFill>
+                  <a:srgbClr val="F3F2F5"/>
+                </a:solidFill>
+                <a:highlight>
+                  <a:srgbClr val="22282A"/>
+                </a:highlight>
+              </a:rPr>
+              <a:t>argv</a:t>
+            </a:r>
+            <a:r>
+              <a:rPr lang="en-US" altLang="zh-CN" dirty="0">
+                <a:solidFill>
+                  <a:srgbClr val="E8E2B7"/>
+                </a:solidFill>
+                <a:highlight>
+                  <a:srgbClr val="22282A"/>
+                </a:highlight>
+              </a:rPr>
+              <a:t>[</a:t>
+            </a:r>
+            <a:r>
+              <a:rPr lang="en-US" altLang="zh-CN" dirty="0">
+                <a:solidFill>
+                  <a:srgbClr val="FFCD22"/>
+                </a:solidFill>
+                <a:highlight>
+                  <a:srgbClr val="22282A"/>
+                </a:highlight>
+              </a:rPr>
+              <a:t>0</a:t>
+            </a:r>
+            <a:r>
+              <a:rPr lang="en-US" altLang="zh-CN" dirty="0">
+                <a:solidFill>
+                  <a:srgbClr val="E8E2B7"/>
+                </a:solidFill>
+                <a:highlight>
+                  <a:srgbClr val="22282A"/>
+                </a:highlight>
+              </a:rPr>
+              <a:t>]);</a:t>
+            </a:r>
+          </a:p>
+          <a:p>
+            <a:r>
+              <a:rPr lang="zh-CN" altLang="en-US" dirty="0">
+                <a:solidFill>
+                  <a:srgbClr val="F1F2F3"/>
+                </a:solidFill>
+                <a:highlight>
+                  <a:srgbClr val="22282A"/>
+                </a:highlight>
+              </a:rPr>
+              <a:t>	</a:t>
+            </a:r>
+            <a:r>
+              <a:rPr lang="en-US" altLang="zh-CN" dirty="0">
+                <a:solidFill>
+                  <a:srgbClr val="E8E2B7"/>
+                </a:solidFill>
+                <a:highlight>
+                  <a:srgbClr val="22282A"/>
+                </a:highlight>
+              </a:rPr>
+              <a:t>}</a:t>
+            </a:r>
+          </a:p>
+          <a:p>
+            <a:r>
+              <a:rPr lang="en-US" altLang="zh-CN" dirty="0">
+                <a:solidFill>
+                  <a:srgbClr val="F1F2F3"/>
+                </a:solidFill>
+                <a:highlight>
+                  <a:srgbClr val="22282A"/>
+                </a:highlight>
+              </a:rPr>
+              <a:t>	</a:t>
+            </a:r>
+            <a:r>
+              <a:rPr lang="en-US" altLang="zh-CN" dirty="0">
+                <a:solidFill>
+                  <a:srgbClr val="93C763"/>
+                </a:solidFill>
+                <a:highlight>
+                  <a:srgbClr val="22282A"/>
+                </a:highlight>
+              </a:rPr>
+              <a:t>else</a:t>
+            </a:r>
+          </a:p>
+          <a:p>
+            <a:r>
+              <a:rPr lang="zh-CN" altLang="en-US" dirty="0">
+                <a:solidFill>
+                  <a:srgbClr val="F1F2F3"/>
+                </a:solidFill>
+                <a:highlight>
+                  <a:srgbClr val="22282A"/>
+                </a:highlight>
+              </a:rPr>
+              <a:t>	</a:t>
+            </a:r>
+            <a:r>
+              <a:rPr lang="en-US" altLang="zh-CN" dirty="0">
+                <a:solidFill>
+                  <a:srgbClr val="E8E2B7"/>
+                </a:solidFill>
+                <a:highlight>
+                  <a:srgbClr val="22282A"/>
+                </a:highlight>
+              </a:rPr>
+              <a:t>{</a:t>
+            </a:r>
+          </a:p>
+          <a:p>
+            <a:r>
+              <a:rPr lang="en-US" altLang="zh-CN" dirty="0">
+                <a:solidFill>
+                  <a:srgbClr val="F1F2F3"/>
+                </a:solidFill>
+                <a:highlight>
+                  <a:srgbClr val="22282A"/>
+                </a:highlight>
+              </a:rPr>
+              <a:t>		</a:t>
+            </a:r>
+            <a:r>
+              <a:rPr lang="en-US" altLang="zh-CN" dirty="0">
+                <a:solidFill>
+                  <a:srgbClr val="F3F2F5"/>
+                </a:solidFill>
+                <a:highlight>
+                  <a:srgbClr val="22282A"/>
+                </a:highlight>
+              </a:rPr>
+              <a:t>FILE</a:t>
+            </a:r>
+            <a:r>
+              <a:rPr lang="en-US" altLang="zh-CN" dirty="0">
+                <a:solidFill>
+                  <a:srgbClr val="F1F2F3"/>
+                </a:solidFill>
+                <a:highlight>
+                  <a:srgbClr val="22282A"/>
+                </a:highlight>
+              </a:rPr>
+              <a:t> </a:t>
+            </a:r>
+            <a:r>
+              <a:rPr lang="en-US" altLang="zh-CN" dirty="0">
+                <a:solidFill>
+                  <a:srgbClr val="E8E2B7"/>
+                </a:solidFill>
+                <a:highlight>
+                  <a:srgbClr val="22282A"/>
+                </a:highlight>
+              </a:rPr>
+              <a:t>*</a:t>
+            </a:r>
+            <a:r>
+              <a:rPr lang="en-US" altLang="zh-CN" dirty="0">
+                <a:solidFill>
+                  <a:srgbClr val="F3F2F5"/>
+                </a:solidFill>
+                <a:highlight>
+                  <a:srgbClr val="22282A"/>
+                </a:highlight>
+              </a:rPr>
+              <a:t>plaintext</a:t>
+            </a:r>
+            <a:r>
+              <a:rPr lang="en-US" altLang="zh-CN" dirty="0">
+                <a:solidFill>
+                  <a:srgbClr val="F1F2F3"/>
+                </a:solidFill>
+                <a:highlight>
+                  <a:srgbClr val="22282A"/>
+                </a:highlight>
+              </a:rPr>
+              <a:t>	</a:t>
+            </a:r>
+            <a:r>
+              <a:rPr lang="en-US" altLang="zh-CN" dirty="0" smtClean="0">
+                <a:solidFill>
+                  <a:srgbClr val="E8E2B7"/>
+                </a:solidFill>
+                <a:highlight>
+                  <a:srgbClr val="22282A"/>
+                </a:highlight>
+              </a:rPr>
+              <a:t>=</a:t>
+            </a:r>
+            <a:r>
+              <a:rPr lang="en-US" altLang="zh-CN" dirty="0" smtClean="0">
+                <a:solidFill>
+                  <a:srgbClr val="F1F2F3"/>
+                </a:solidFill>
+                <a:highlight>
+                  <a:srgbClr val="22282A"/>
+                </a:highlight>
+              </a:rPr>
+              <a:t> </a:t>
+            </a:r>
+            <a:r>
+              <a:rPr lang="en-US" altLang="zh-CN" dirty="0" err="1">
+                <a:solidFill>
+                  <a:srgbClr val="F3F2F5"/>
+                </a:solidFill>
+                <a:highlight>
+                  <a:srgbClr val="22282A"/>
+                </a:highlight>
+              </a:rPr>
+              <a:t>fopen</a:t>
+            </a:r>
+            <a:r>
+              <a:rPr lang="en-US" altLang="zh-CN" dirty="0">
+                <a:solidFill>
+                  <a:srgbClr val="E8E2B7"/>
+                </a:solidFill>
+                <a:highlight>
+                  <a:srgbClr val="22282A"/>
+                </a:highlight>
+              </a:rPr>
+              <a:t>(</a:t>
+            </a:r>
+            <a:r>
+              <a:rPr lang="en-US" altLang="zh-CN" dirty="0" err="1">
+                <a:solidFill>
+                  <a:srgbClr val="F3F2F5"/>
+                </a:solidFill>
+                <a:highlight>
+                  <a:srgbClr val="22282A"/>
+                </a:highlight>
+              </a:rPr>
+              <a:t>argv</a:t>
+            </a:r>
+            <a:r>
+              <a:rPr lang="en-US" altLang="zh-CN" dirty="0">
+                <a:solidFill>
+                  <a:srgbClr val="E8E2B7"/>
+                </a:solidFill>
+                <a:highlight>
+                  <a:srgbClr val="22282A"/>
+                </a:highlight>
+              </a:rPr>
+              <a:t>[</a:t>
+            </a:r>
+            <a:r>
+              <a:rPr lang="en-US" altLang="zh-CN" dirty="0">
+                <a:solidFill>
+                  <a:srgbClr val="FFCD22"/>
+                </a:solidFill>
+                <a:highlight>
+                  <a:srgbClr val="22282A"/>
+                </a:highlight>
+              </a:rPr>
+              <a:t>1</a:t>
+            </a:r>
+            <a:r>
+              <a:rPr lang="en-US" altLang="zh-CN" dirty="0">
+                <a:solidFill>
+                  <a:srgbClr val="E8E2B7"/>
+                </a:solidFill>
+                <a:highlight>
+                  <a:srgbClr val="22282A"/>
+                </a:highlight>
+              </a:rPr>
+              <a:t>],</a:t>
+            </a:r>
+            <a:r>
+              <a:rPr lang="en-US" altLang="zh-CN" dirty="0">
+                <a:solidFill>
+                  <a:srgbClr val="EC7600"/>
+                </a:solidFill>
+                <a:highlight>
+                  <a:srgbClr val="22282A"/>
+                </a:highlight>
+              </a:rPr>
+              <a:t>"r"</a:t>
+            </a:r>
+            <a:r>
+              <a:rPr lang="en-US" altLang="zh-CN" dirty="0">
+                <a:solidFill>
+                  <a:srgbClr val="E8E2B7"/>
+                </a:solidFill>
+                <a:highlight>
+                  <a:srgbClr val="22282A"/>
+                </a:highlight>
+              </a:rPr>
+              <a:t>);</a:t>
+            </a:r>
+          </a:p>
+          <a:p>
+            <a:r>
+              <a:rPr lang="en-US" altLang="zh-CN" dirty="0">
+                <a:solidFill>
+                  <a:srgbClr val="F1F2F3"/>
+                </a:solidFill>
+                <a:highlight>
+                  <a:srgbClr val="22282A"/>
+                </a:highlight>
+              </a:rPr>
+              <a:t>		</a:t>
+            </a:r>
+            <a:r>
+              <a:rPr lang="en-US" altLang="zh-CN" dirty="0">
+                <a:solidFill>
+                  <a:srgbClr val="F3F2F5"/>
+                </a:solidFill>
+                <a:highlight>
+                  <a:srgbClr val="22282A"/>
+                </a:highlight>
+              </a:rPr>
+              <a:t>FILE</a:t>
+            </a:r>
+            <a:r>
+              <a:rPr lang="en-US" altLang="zh-CN" dirty="0">
+                <a:solidFill>
+                  <a:srgbClr val="F1F2F3"/>
+                </a:solidFill>
+                <a:highlight>
+                  <a:srgbClr val="22282A"/>
+                </a:highlight>
+              </a:rPr>
+              <a:t> </a:t>
+            </a:r>
+            <a:r>
+              <a:rPr lang="en-US" altLang="zh-CN" dirty="0">
+                <a:solidFill>
+                  <a:srgbClr val="E8E2B7"/>
+                </a:solidFill>
+                <a:highlight>
+                  <a:srgbClr val="22282A"/>
+                </a:highlight>
+              </a:rPr>
+              <a:t>*</a:t>
+            </a:r>
+            <a:r>
+              <a:rPr lang="en-US" altLang="zh-CN" dirty="0" err="1">
+                <a:solidFill>
+                  <a:srgbClr val="F3F2F5"/>
+                </a:solidFill>
+                <a:highlight>
+                  <a:srgbClr val="22282A"/>
+                </a:highlight>
+              </a:rPr>
+              <a:t>ciphertext</a:t>
+            </a:r>
+            <a:r>
+              <a:rPr lang="en-US" altLang="zh-CN" dirty="0">
+                <a:solidFill>
+                  <a:srgbClr val="F1F2F3"/>
+                </a:solidFill>
+                <a:highlight>
+                  <a:srgbClr val="22282A"/>
+                </a:highlight>
+              </a:rPr>
+              <a:t>	</a:t>
+            </a:r>
+            <a:r>
+              <a:rPr lang="en-US" altLang="zh-CN" dirty="0">
+                <a:solidFill>
+                  <a:srgbClr val="E8E2B7"/>
+                </a:solidFill>
+                <a:highlight>
+                  <a:srgbClr val="22282A"/>
+                </a:highlight>
+              </a:rPr>
+              <a:t>=</a:t>
+            </a:r>
+            <a:r>
+              <a:rPr lang="en-US" altLang="zh-CN" dirty="0">
+                <a:solidFill>
+                  <a:srgbClr val="F1F2F3"/>
+                </a:solidFill>
+                <a:highlight>
+                  <a:srgbClr val="22282A"/>
+                </a:highlight>
+              </a:rPr>
+              <a:t> </a:t>
+            </a:r>
+            <a:r>
+              <a:rPr lang="en-US" altLang="zh-CN" dirty="0" err="1">
+                <a:solidFill>
+                  <a:srgbClr val="F3F2F5"/>
+                </a:solidFill>
+                <a:highlight>
+                  <a:srgbClr val="22282A"/>
+                </a:highlight>
+              </a:rPr>
+              <a:t>fopen</a:t>
+            </a:r>
+            <a:r>
+              <a:rPr lang="en-US" altLang="zh-CN" dirty="0">
+                <a:solidFill>
+                  <a:srgbClr val="E8E2B7"/>
+                </a:solidFill>
+                <a:highlight>
+                  <a:srgbClr val="22282A"/>
+                </a:highlight>
+              </a:rPr>
+              <a:t>(</a:t>
+            </a:r>
+            <a:r>
+              <a:rPr lang="en-US" altLang="zh-CN" dirty="0" err="1">
+                <a:solidFill>
+                  <a:srgbClr val="F3F2F5"/>
+                </a:solidFill>
+                <a:highlight>
+                  <a:srgbClr val="22282A"/>
+                </a:highlight>
+              </a:rPr>
+              <a:t>argv</a:t>
+            </a:r>
+            <a:r>
+              <a:rPr lang="en-US" altLang="zh-CN" dirty="0">
+                <a:solidFill>
+                  <a:srgbClr val="E8E2B7"/>
+                </a:solidFill>
+                <a:highlight>
+                  <a:srgbClr val="22282A"/>
+                </a:highlight>
+              </a:rPr>
+              <a:t>[</a:t>
+            </a:r>
+            <a:r>
+              <a:rPr lang="en-US" altLang="zh-CN" dirty="0">
+                <a:solidFill>
+                  <a:srgbClr val="FFCD22"/>
+                </a:solidFill>
+                <a:highlight>
+                  <a:srgbClr val="22282A"/>
+                </a:highlight>
+              </a:rPr>
+              <a:t>2</a:t>
+            </a:r>
+            <a:r>
+              <a:rPr lang="en-US" altLang="zh-CN" dirty="0">
+                <a:solidFill>
+                  <a:srgbClr val="E8E2B7"/>
+                </a:solidFill>
+                <a:highlight>
+                  <a:srgbClr val="22282A"/>
+                </a:highlight>
+              </a:rPr>
+              <a:t>],</a:t>
+            </a:r>
+            <a:r>
+              <a:rPr lang="en-US" altLang="zh-CN" dirty="0">
+                <a:solidFill>
+                  <a:srgbClr val="EC7600"/>
+                </a:solidFill>
+                <a:highlight>
+                  <a:srgbClr val="22282A"/>
+                </a:highlight>
+              </a:rPr>
+              <a:t>"w</a:t>
+            </a:r>
+            <a:r>
+              <a:rPr lang="en-US" altLang="zh-CN" dirty="0" smtClean="0">
+                <a:solidFill>
+                  <a:srgbClr val="EC7600"/>
+                </a:solidFill>
+                <a:highlight>
+                  <a:srgbClr val="22282A"/>
+                </a:highlight>
+              </a:rPr>
+              <a:t>"</a:t>
+            </a:r>
+            <a:r>
+              <a:rPr lang="en-US" altLang="zh-CN" dirty="0" smtClean="0">
+                <a:solidFill>
+                  <a:srgbClr val="E8E2B7"/>
+                </a:solidFill>
+                <a:highlight>
+                  <a:srgbClr val="22282A"/>
+                </a:highlight>
+              </a:rPr>
+              <a:t>);</a:t>
+            </a:r>
+          </a:p>
+          <a:p>
+            <a:r>
+              <a:rPr lang="en-US" altLang="zh-CN" dirty="0">
+                <a:solidFill>
+                  <a:srgbClr val="E8E2B7"/>
+                </a:solidFill>
+                <a:highlight>
+                  <a:srgbClr val="22282A"/>
+                </a:highlight>
+              </a:rPr>
+              <a:t>	</a:t>
+            </a:r>
+            <a:r>
+              <a:rPr lang="en-US" altLang="zh-CN" dirty="0" smtClean="0">
+                <a:solidFill>
+                  <a:srgbClr val="E8E2B7"/>
+                </a:solidFill>
+                <a:highlight>
+                  <a:srgbClr val="22282A"/>
+                </a:highlight>
+              </a:rPr>
+              <a:t>	…</a:t>
+            </a:r>
+          </a:p>
+          <a:p>
+            <a:r>
+              <a:rPr lang="en-US" altLang="zh-CN" dirty="0" smtClean="0">
+                <a:solidFill>
+                  <a:srgbClr val="E8E2B7"/>
+                </a:solidFill>
+                <a:highlight>
+                  <a:srgbClr val="22282A"/>
+                </a:highlight>
+              </a:rPr>
+              <a:t>	}</a:t>
+            </a:r>
+          </a:p>
+          <a:p>
+            <a:r>
+              <a:rPr lang="en-US" altLang="zh-CN" dirty="0">
+                <a:solidFill>
+                  <a:srgbClr val="E8E2B7"/>
+                </a:solidFill>
+                <a:highlight>
+                  <a:srgbClr val="22282A"/>
+                </a:highlight>
+              </a:rPr>
+              <a:t>	</a:t>
+            </a:r>
+            <a:r>
+              <a:rPr lang="en-US" altLang="zh-CN" dirty="0" smtClean="0">
+                <a:solidFill>
+                  <a:srgbClr val="E8E2B7"/>
+                </a:solidFill>
+                <a:highlight>
+                  <a:srgbClr val="22282A"/>
+                </a:highlight>
+              </a:rPr>
+              <a:t>return 0;</a:t>
+            </a:r>
+          </a:p>
+          <a:p>
+            <a:r>
+              <a:rPr lang="en-US" altLang="zh-CN" dirty="0">
+                <a:solidFill>
+                  <a:srgbClr val="E8E2B7"/>
+                </a:solidFill>
+                <a:highlight>
+                  <a:srgbClr val="22282A"/>
+                </a:highlight>
+              </a:rPr>
+              <a:t>}</a:t>
+            </a:r>
+            <a:endParaRPr lang="zh-CN" altLang="en-US" dirty="0"/>
+          </a:p>
+        </p:txBody>
+      </p:sp>
+    </p:spTree>
+    <p:extLst>
+      <p:ext uri="{BB962C8B-B14F-4D97-AF65-F5344CB8AC3E}">
+        <p14:creationId xmlns:p14="http://schemas.microsoft.com/office/powerpoint/2010/main" val="142370167"/>
+      </p:ext>
+    </p:extLst>
+  </p:cSld>
+  <p:clrMapOvr>
+    <a:masterClrMapping/>
+  </p:clrMapOvr>
+  <mc:AlternateContent xmlns:mc="http://schemas.openxmlformats.org/markup-compatibility/2006" xmlns:p14="http://schemas.microsoft.com/office/powerpoint/2010/main">
+    <mc:Choice Requires="p14">
+      <p:transition spd="med" p14:dur="700">
+        <p:fade/>
+      </p:transition>
+    </mc:Choice>
+    <mc:Fallback xmlns="">
+      <p:transition spd="med">
+        <p:fade/>
+      </p:transition>
+    </mc:Fallback>
+  </mc:AlternateContent>
+  <p:timing>
+    <p:tnLst>
+      <p:par>
+        <p:cTn id="1" dur="indefinite" restart="never" nodeType="tmRoot"/>
+      </p:par>
+    </p:tnLst>
+  </p:timing>
+</p:sld>
+</file>
+
+<file path=ppt/slides/slide11.xml><?xml version="1.0" encoding="utf-8"?>
+<p:sld xmlns:a="http://schemas.openxmlformats.org/drawingml/2006/main" xmlns:r="http://schemas.openxmlformats.org/officeDocument/2006/relationships" xmlns:p="http://schemas.openxmlformats.org/presentationml/2006/main">
+  <p:cSld>
+    <p:spTree>
+      <p:nvGrpSpPr>
+        <p:cNvPr id="1" name=""/>
+        <p:cNvGrpSpPr/>
+        <p:nvPr/>
+      </p:nvGrpSpPr>
+      <p:grpSpPr>
+        <a:xfrm>
+          <a:off x="0" y="0"/>
+          <a:ext cx="0" cy="0"/>
+          <a:chOff x="0" y="0"/>
+          <a:chExt cx="0" cy="0"/>
+        </a:xfrm>
+      </p:grpSpPr>
+      <p:sp>
+        <p:nvSpPr>
+          <p:cNvPr id="2" name="标题 1"/>
+          <p:cNvSpPr>
+            <a:spLocks noGrp="1"/>
+          </p:cNvSpPr>
+          <p:nvPr>
+            <p:ph type="title"/>
+          </p:nvPr>
+        </p:nvSpPr>
+        <p:spPr/>
+        <p:txBody>
+          <a:bodyPr/>
+          <a:lstStyle/>
+          <a:p>
+            <a:r>
+              <a:rPr lang="en-US" altLang="zh-CN" dirty="0" smtClean="0"/>
+              <a:t>Homework</a:t>
+            </a:r>
+            <a:endParaRPr lang="zh-CN" altLang="en-US" dirty="0"/>
+          </a:p>
+        </p:txBody>
+      </p:sp>
+      <p:sp>
+        <p:nvSpPr>
+          <p:cNvPr id="3" name="内容占位符 2"/>
+          <p:cNvSpPr>
+            <a:spLocks noGrp="1"/>
+          </p:cNvSpPr>
+          <p:nvPr>
+            <p:ph idx="1"/>
+          </p:nvPr>
+        </p:nvSpPr>
+        <p:spPr/>
+        <p:txBody>
+          <a:bodyPr>
+            <a:normAutofit fontScale="92500"/>
+          </a:bodyPr>
+          <a:lstStyle/>
+          <a:p>
+            <a:r>
+              <a:rPr lang="en-US" altLang="zh-CN" dirty="0" smtClean="0"/>
+              <a:t>We’ve already make a program to encrypt message, make another program to decrypt the code text to plaintext , also the program should support command line argument </a:t>
+            </a:r>
+          </a:p>
+          <a:p>
+            <a:r>
+              <a:rPr lang="en-US" altLang="zh-CN" dirty="0"/>
+              <a:t>The </a:t>
+            </a:r>
+            <a:r>
+              <a:rPr lang="en-US" altLang="zh-CN" dirty="0" smtClean="0"/>
+              <a:t>encryption method we just used is called </a:t>
+            </a:r>
+            <a:r>
+              <a:rPr lang="en-US" altLang="zh-CN" dirty="0"/>
+              <a:t>Caesar cipher(</a:t>
+            </a:r>
+            <a:r>
+              <a:rPr lang="en-US" altLang="zh-CN" dirty="0">
+                <a:hlinkClick r:id="rId2"/>
+              </a:rPr>
+              <a:t>http://</a:t>
+            </a:r>
+            <a:r>
+              <a:rPr lang="en-US" altLang="zh-CN" dirty="0" smtClean="0">
+                <a:hlinkClick r:id="rId2"/>
+              </a:rPr>
+              <a:t>en.wikipedia.org/wiki/Caesar_cipher</a:t>
+            </a:r>
+            <a:r>
+              <a:rPr lang="en-US" altLang="zh-CN" dirty="0" smtClean="0"/>
+              <a:t>), it is old and easy to hack. </a:t>
+            </a:r>
+            <a:r>
+              <a:rPr lang="en-US" altLang="zh-CN" dirty="0"/>
+              <a:t>Think </a:t>
+            </a:r>
+            <a:r>
+              <a:rPr lang="en-US" altLang="zh-CN" dirty="0" smtClean="0"/>
+              <a:t>about it, how to hack Caesar cipher? </a:t>
+            </a:r>
+          </a:p>
+          <a:p>
+            <a:r>
+              <a:rPr lang="en-US" altLang="zh-CN" dirty="0"/>
+              <a:t>C</a:t>
+            </a:r>
+            <a:r>
+              <a:rPr lang="en-US" altLang="zh-CN" dirty="0" smtClean="0"/>
+              <a:t>aesar cipher is not safe, but another cipher called </a:t>
+            </a:r>
+            <a:r>
+              <a:rPr lang="en-US" altLang="zh-CN" dirty="0" err="1"/>
+              <a:t>Vigenère</a:t>
+            </a:r>
+            <a:r>
+              <a:rPr lang="en-US" altLang="zh-CN" dirty="0"/>
+              <a:t> cipher(</a:t>
+            </a:r>
+            <a:r>
+              <a:rPr lang="en-US" altLang="zh-CN" dirty="0">
+                <a:hlinkClick r:id="rId3"/>
+              </a:rPr>
+              <a:t>http://</a:t>
+            </a:r>
+            <a:r>
+              <a:rPr lang="en-US" altLang="zh-CN" dirty="0" smtClean="0">
+                <a:hlinkClick r:id="rId3"/>
+              </a:rPr>
+              <a:t>en.wikipedia.org/wiki/Vigen%C3%A8re_cipher</a:t>
+            </a:r>
+            <a:r>
+              <a:rPr lang="en-US" altLang="zh-CN" dirty="0" smtClean="0"/>
+              <a:t>) based on Caesar cipher is more complex and hard to hack. If you are interested, program it. </a:t>
+            </a:r>
+            <a:endParaRPr lang="en-US" altLang="zh-CN" dirty="0"/>
+          </a:p>
+          <a:p>
+            <a:endParaRPr lang="en-US" altLang="zh-CN" dirty="0"/>
+          </a:p>
+          <a:p>
+            <a:endParaRPr lang="en-US" altLang="zh-CN" dirty="0" smtClean="0"/>
+          </a:p>
+          <a:p>
+            <a:endParaRPr lang="en-US" altLang="zh-CN" dirty="0"/>
+          </a:p>
+        </p:txBody>
+      </p:sp>
+      <p:sp>
+        <p:nvSpPr>
+          <p:cNvPr id="4" name="五角星 3"/>
+          <p:cNvSpPr/>
+          <p:nvPr/>
+        </p:nvSpPr>
+        <p:spPr>
+          <a:xfrm>
+            <a:off x="1197868" y="1772816"/>
+            <a:ext cx="288032" cy="288032"/>
+          </a:xfrm>
+          <a:prstGeom prst="star5">
+            <a:avLst/>
+          </a:prstGeom>
+        </p:spPr>
+        <p:style>
+          <a:lnRef idx="1">
+            <a:schemeClr val="accent2"/>
+          </a:lnRef>
+          <a:fillRef idx="2">
+            <a:schemeClr val="accent2"/>
+          </a:fillRef>
+          <a:effectRef idx="1">
+            <a:schemeClr val="accent2"/>
+          </a:effectRef>
+          <a:fontRef idx="minor">
+            <a:schemeClr val="dk1"/>
+          </a:fontRef>
+        </p:style>
+        <p:txBody>
+          <a:bodyPr rtlCol="0" anchor="ctr"/>
+          <a:lstStyle/>
+          <a:p>
+            <a:pPr algn="ctr"/>
+            <a:endParaRPr lang="zh-CN" altLang="en-US" sz="2800"/>
+          </a:p>
+        </p:txBody>
+      </p:sp>
+      <p:sp>
+        <p:nvSpPr>
+          <p:cNvPr id="5" name="五角星 4"/>
+          <p:cNvSpPr/>
+          <p:nvPr/>
+        </p:nvSpPr>
+        <p:spPr>
+          <a:xfrm>
+            <a:off x="1269876" y="2996952"/>
+            <a:ext cx="288032" cy="288032"/>
+          </a:xfrm>
+          <a:prstGeom prst="star5">
+            <a:avLst/>
+          </a:prstGeom>
+        </p:spPr>
+        <p:style>
+          <a:lnRef idx="1">
+            <a:schemeClr val="accent2"/>
+          </a:lnRef>
+          <a:fillRef idx="2">
+            <a:schemeClr val="accent2"/>
+          </a:fillRef>
+          <a:effectRef idx="1">
+            <a:schemeClr val="accent2"/>
+          </a:effectRef>
+          <a:fontRef idx="minor">
+            <a:schemeClr val="dk1"/>
+          </a:fontRef>
+        </p:style>
+        <p:txBody>
+          <a:bodyPr rtlCol="0" anchor="ctr"/>
+          <a:lstStyle/>
+          <a:p>
+            <a:pPr algn="ctr"/>
+            <a:endParaRPr lang="zh-CN" altLang="en-US" sz="2800"/>
+          </a:p>
+        </p:txBody>
+      </p:sp>
+      <p:sp>
+        <p:nvSpPr>
+          <p:cNvPr id="6" name="五角星 5"/>
+          <p:cNvSpPr/>
+          <p:nvPr/>
+        </p:nvSpPr>
+        <p:spPr>
+          <a:xfrm>
+            <a:off x="888821" y="3000400"/>
+            <a:ext cx="288032" cy="288032"/>
+          </a:xfrm>
+          <a:prstGeom prst="star5">
+            <a:avLst/>
+          </a:prstGeom>
+        </p:spPr>
+        <p:style>
+          <a:lnRef idx="1">
+            <a:schemeClr val="accent2"/>
+          </a:lnRef>
+          <a:fillRef idx="2">
+            <a:schemeClr val="accent2"/>
+          </a:fillRef>
+          <a:effectRef idx="1">
+            <a:schemeClr val="accent2"/>
+          </a:effectRef>
+          <a:fontRef idx="minor">
+            <a:schemeClr val="dk1"/>
+          </a:fontRef>
+        </p:style>
+        <p:txBody>
+          <a:bodyPr rtlCol="0" anchor="ctr"/>
+          <a:lstStyle/>
+          <a:p>
+            <a:pPr algn="ctr"/>
+            <a:endParaRPr lang="zh-CN" altLang="en-US" sz="2800"/>
+          </a:p>
+        </p:txBody>
+      </p:sp>
+      <p:sp>
+        <p:nvSpPr>
+          <p:cNvPr id="7" name="五角星 6"/>
+          <p:cNvSpPr/>
+          <p:nvPr/>
+        </p:nvSpPr>
+        <p:spPr>
+          <a:xfrm>
+            <a:off x="1210374" y="4317224"/>
+            <a:ext cx="288032" cy="288032"/>
+          </a:xfrm>
+          <a:prstGeom prst="star5">
+            <a:avLst/>
+          </a:prstGeom>
+        </p:spPr>
+        <p:style>
+          <a:lnRef idx="1">
+            <a:schemeClr val="accent2"/>
+          </a:lnRef>
+          <a:fillRef idx="2">
+            <a:schemeClr val="accent2"/>
+          </a:fillRef>
+          <a:effectRef idx="1">
+            <a:schemeClr val="accent2"/>
+          </a:effectRef>
+          <a:fontRef idx="minor">
+            <a:schemeClr val="dk1"/>
+          </a:fontRef>
+        </p:style>
+        <p:txBody>
+          <a:bodyPr rtlCol="0" anchor="ctr"/>
+          <a:lstStyle/>
+          <a:p>
+            <a:pPr algn="ctr"/>
+            <a:endParaRPr lang="zh-CN" altLang="en-US" sz="2800"/>
+          </a:p>
+        </p:txBody>
+      </p:sp>
+      <p:sp>
+        <p:nvSpPr>
+          <p:cNvPr id="8" name="五角星 7"/>
+          <p:cNvSpPr/>
+          <p:nvPr/>
+        </p:nvSpPr>
+        <p:spPr>
+          <a:xfrm>
+            <a:off x="782581" y="4320927"/>
+            <a:ext cx="288032" cy="288032"/>
+          </a:xfrm>
+          <a:prstGeom prst="star5">
+            <a:avLst/>
+          </a:prstGeom>
+        </p:spPr>
+        <p:style>
+          <a:lnRef idx="1">
+            <a:schemeClr val="accent2"/>
+          </a:lnRef>
+          <a:fillRef idx="2">
+            <a:schemeClr val="accent2"/>
+          </a:fillRef>
+          <a:effectRef idx="1">
+            <a:schemeClr val="accent2"/>
+          </a:effectRef>
+          <a:fontRef idx="minor">
+            <a:schemeClr val="dk1"/>
+          </a:fontRef>
+        </p:style>
+        <p:txBody>
+          <a:bodyPr rtlCol="0" anchor="ctr"/>
+          <a:lstStyle/>
+          <a:p>
+            <a:pPr algn="ctr"/>
+            <a:endParaRPr lang="zh-CN" altLang="en-US" sz="2800"/>
+          </a:p>
+        </p:txBody>
+      </p:sp>
+      <p:sp>
+        <p:nvSpPr>
+          <p:cNvPr id="9" name="五角星 8"/>
+          <p:cNvSpPr/>
+          <p:nvPr/>
+        </p:nvSpPr>
+        <p:spPr>
+          <a:xfrm>
+            <a:off x="354788" y="4317224"/>
+            <a:ext cx="288032" cy="288032"/>
+          </a:xfrm>
+          <a:prstGeom prst="star5">
+            <a:avLst/>
+          </a:prstGeom>
+        </p:spPr>
+        <p:style>
+          <a:lnRef idx="1">
+            <a:schemeClr val="accent2"/>
+          </a:lnRef>
+          <a:fillRef idx="2">
+            <a:schemeClr val="accent2"/>
+          </a:fillRef>
+          <a:effectRef idx="1">
+            <a:schemeClr val="accent2"/>
+          </a:effectRef>
+          <a:fontRef idx="minor">
+            <a:schemeClr val="dk1"/>
+          </a:fontRef>
+        </p:style>
+        <p:txBody>
+          <a:bodyPr rtlCol="0" anchor="ctr"/>
+          <a:lstStyle/>
+          <a:p>
+            <a:pPr algn="ctr"/>
+            <a:endParaRPr lang="zh-CN" altLang="en-US" sz="2800"/>
+          </a:p>
+        </p:txBody>
+      </p:sp>
+    </p:spTree>
+    <p:extLst>
+      <p:ext uri="{BB962C8B-B14F-4D97-AF65-F5344CB8AC3E}">
+        <p14:creationId xmlns:p14="http://schemas.microsoft.com/office/powerpoint/2010/main" val="3990256269"/>
+      </p:ext>
+    </p:extLst>
+  </p:cSld>
+  <p:clrMapOvr>
+    <a:masterClrMapping/>
+  </p:clrMapOvr>
+  <mc:AlternateContent xmlns:mc="http://schemas.openxmlformats.org/markup-compatibility/2006" xmlns:p14="http://schemas.microsoft.com/office/powerpoint/2010/main">
+    <mc:Choice Requires="p14">
+      <p:transition spd="med" p14:dur="700">
+        <p:fade/>
+      </p:transition>
+    </mc:Choice>
+    <mc:Fallback xmlns="">
+      <p:transition spd="med">
+        <p:fade/>
+      </p:transition>
+    </mc:Fallback>
+  </mc:AlternateContent>
+  <p:timing>
+    <p:tnLst>
+      <p:par>
+        <p:cTn id="1" dur="indefinite" restart="never" nodeType="tmRoot"/>
+      </p:par>
+    </p:tnLst>
+  </p:timing>
+</p:sld>
+</file>
+
+<file path=ppt/slides/slide12.xml><?xml version="1.0" encoding="utf-8"?>
+<p:sld xmlns:a="http://schemas.openxmlformats.org/drawingml/2006/main" xmlns:r="http://schemas.openxmlformats.org/officeDocument/2006/relationships" xmlns:p="http://schemas.openxmlformats.org/presentationml/2006/main">
+  <p:cSld>
+    <p:spTree>
+      <p:nvGrpSpPr>
+        <p:cNvPr id="1" name=""/>
+        <p:cNvGrpSpPr/>
+        <p:nvPr/>
+      </p:nvGrpSpPr>
+      <p:grpSpPr>
+        <a:xfrm>
+          <a:off x="0" y="0"/>
+          <a:ext cx="0" cy="0"/>
+          <a:chOff x="0" y="0"/>
+          <a:chExt cx="0" cy="0"/>
+        </a:xfrm>
+      </p:grpSpPr>
+      <p:sp>
+        <p:nvSpPr>
+          <p:cNvPr id="2" name="标题 1"/>
+          <p:cNvSpPr>
+            <a:spLocks noGrp="1"/>
+          </p:cNvSpPr>
+          <p:nvPr>
+            <p:ph type="title"/>
+          </p:nvPr>
+        </p:nvSpPr>
+        <p:spPr/>
+        <p:txBody>
+          <a:bodyPr/>
+          <a:lstStyle/>
+          <a:p>
+            <a:r>
+              <a:rPr lang="en-US" altLang="zh-CN" dirty="0" smtClean="0"/>
               <a:t>Next time</a:t>
             </a:r>
             <a:endParaRPr lang="zh-CN" altLang="en-US" dirty="0"/>
@@ -6812,7 +8253,7 @@
           <a:p>
             <a:r>
               <a:rPr lang="en-US" altLang="zh-CN" dirty="0" smtClean="0"/>
-              <a:t>Task</a:t>
+              <a:t>Binary File I/O</a:t>
             </a:r>
             <a:endParaRPr lang="zh-CN" altLang="en-US" dirty="0"/>
           </a:p>
@@ -6820,84 +8261,115 @@
       </p:sp>
       <p:sp>
         <p:nvSpPr>
-          <p:cNvPr id="3" name="内容占位符 2"/>
-          <p:cNvSpPr>
-            <a:spLocks noGrp="1"/>
-          </p:cNvSpPr>
-          <p:nvPr>
-            <p:ph idx="1"/>
-          </p:nvPr>
+          <p:cNvPr id="5" name="矩形 4"/>
+          <p:cNvSpPr/>
+          <p:nvPr/>
         </p:nvSpPr>
-        <p:spPr/>
+        <p:spPr>
+          <a:xfrm>
+            <a:off x="1218883" y="2132856"/>
+            <a:ext cx="9700065" cy="1938992"/>
+          </a:xfrm>
+          <a:prstGeom prst="rect">
+            <a:avLst/>
+          </a:prstGeom>
+          <a:solidFill>
+            <a:schemeClr val="bg1">
+              <a:lumMod val="85000"/>
+              <a:lumOff val="15000"/>
+            </a:schemeClr>
+          </a:solidFill>
+          <a:ln>
+            <a:solidFill>
+              <a:schemeClr val="bg1">
+                <a:lumMod val="85000"/>
+                <a:lumOff val="15000"/>
+              </a:schemeClr>
+            </a:solidFill>
+          </a:ln>
+        </p:spPr>
         <p:txBody>
-          <a:bodyPr/>
+          <a:bodyPr wrap="square">
+            <a:spAutoFit/>
+          </a:bodyPr>
           <a:lstStyle/>
           <a:p>
-            <a:r>
-              <a:rPr lang="en-US" altLang="zh-CN" dirty="0" smtClean="0"/>
-              <a:t>Open a file (plaintext), read content one by one</a:t>
-            </a:r>
-          </a:p>
-          <a:p>
-            <a:r>
-              <a:rPr lang="en-US" altLang="zh-CN" dirty="0"/>
-              <a:t>Encrypt </a:t>
-            </a:r>
-            <a:r>
-              <a:rPr lang="en-US" altLang="zh-CN" dirty="0" smtClean="0"/>
-              <a:t>the content</a:t>
-            </a:r>
-          </a:p>
-          <a:p>
-            <a:r>
-              <a:rPr lang="en-US" altLang="zh-CN" dirty="0" smtClean="0"/>
-              <a:t>Write in another </a:t>
-            </a:r>
-            <a:r>
-              <a:rPr lang="en-US" altLang="zh-CN" dirty="0"/>
-              <a:t>file (</a:t>
-            </a:r>
-            <a:r>
-              <a:rPr lang="en-US" altLang="zh-CN" dirty="0" err="1"/>
-              <a:t>ciphertext</a:t>
-            </a:r>
-            <a:r>
-              <a:rPr lang="en-US" altLang="zh-CN" dirty="0"/>
-              <a:t>)</a:t>
-            </a:r>
-            <a:endParaRPr lang="zh-CN" altLang="en-US" dirty="0"/>
+            <a:pPr lvl="0" defTabSz="914400" eaLnBrk="0" fontAlgn="base" hangingPunct="0">
+              <a:spcBef>
+                <a:spcPct val="0"/>
+              </a:spcBef>
+              <a:spcAft>
+                <a:spcPct val="0"/>
+              </a:spcAft>
+            </a:pPr>
+            <a:r>
+              <a:rPr lang="zh-CN" altLang="zh-CN" b="1" dirty="0">
+                <a:cs typeface="Courier New" panose="02070309020205020404" pitchFamily="49" charset="0"/>
+              </a:rPr>
+              <a:t>size_t fread(void *ptr, size_t size_of_elements, size_t number_of_elements, FILE *a_file); </a:t>
+            </a:r>
+            <a:endParaRPr lang="en-US" altLang="zh-CN" b="1" dirty="0">
+              <a:cs typeface="Courier New" panose="02070309020205020404" pitchFamily="49" charset="0"/>
+            </a:endParaRPr>
+          </a:p>
+          <a:p>
+            <a:pPr lvl="0" defTabSz="914400" eaLnBrk="0" fontAlgn="base" hangingPunct="0">
+              <a:spcBef>
+                <a:spcPct val="0"/>
+              </a:spcBef>
+              <a:spcAft>
+                <a:spcPct val="0"/>
+              </a:spcAft>
+            </a:pPr>
+            <a:endParaRPr lang="en-US" altLang="zh-CN" b="1" dirty="0">
+              <a:cs typeface="Courier New" panose="02070309020205020404" pitchFamily="49" charset="0"/>
+            </a:endParaRPr>
+          </a:p>
+          <a:p>
+            <a:pPr lvl="0" defTabSz="914400" eaLnBrk="0" fontAlgn="base" hangingPunct="0">
+              <a:spcBef>
+                <a:spcPct val="0"/>
+              </a:spcBef>
+              <a:spcAft>
+                <a:spcPct val="0"/>
+              </a:spcAft>
+            </a:pPr>
+            <a:r>
+              <a:rPr lang="zh-CN" altLang="zh-CN" b="1" dirty="0">
+                <a:cs typeface="Courier New" panose="02070309020205020404" pitchFamily="49" charset="0"/>
+              </a:rPr>
+              <a:t>size_t fwrite(const void *ptr, size_t size_of_elements, size_t number_of_elements, FILE *a_file);</a:t>
+            </a:r>
+            <a:r>
+              <a:rPr lang="zh-CN" altLang="zh-CN" b="1" dirty="0"/>
+              <a:t> </a:t>
+            </a:r>
+            <a:endParaRPr lang="zh-CN" altLang="zh-CN" sz="5400" b="1" dirty="0"/>
           </a:p>
         </p:txBody>
       </p:sp>
     </p:spTree>
     <p:extLst>
       <p:ext uri="{BB962C8B-B14F-4D97-AF65-F5344CB8AC3E}">
-        <p14:creationId xmlns:p14="http://schemas.microsoft.com/office/powerpoint/2010/main" val="1498808498"/>
+        <p14:creationId xmlns:p14="http://schemas.microsoft.com/office/powerpoint/2010/main" val="4000082887"/>
       </p:ext>
     </p:extLst>
   </p:cSld>
   <p:clrMapOvr>
     <a:masterClrMapping/>
   </p:clrMapOvr>
-  <mc:AlternateContent xmlns:mc="http://schemas.openxmlformats.org/markup-compatibility/2006" xmlns:p14="http://schemas.microsoft.com/office/powerpoint/2010/main">
-    <mc:Choice Requires="p14">
+  <mc:AlternateContent xmlns:mc="http://schemas.openxmlformats.org/markup-compatibility/2006">
+    <mc:Choice xmlns:p14="http://schemas.microsoft.com/office/powerpoint/2010/main" Requires="p14">
       <p:transition spd="med" p14:dur="700">
         <p:fade/>
       </p:transition>
     </mc:Choice>
-    <mc:Fallback xmlns="">
+    <mc:Fallback>
       <p:transition spd="med">
         <p:fade/>
       </p:transition>
     </mc:Fallback>
   </mc:AlternateContent>
-  <p:timing>
-    <p:tnLst>
-      <p:par>
-        <p:cTn id="1" dur="indefinite" restart="never" nodeType="tmRoot"/>
-      </p:par>
-    </p:tnLst>
-  </p:timing>
 </p:sld>
 </file>
 
@@ -6935,7 +8407,7 @@
           <a:p>
             <a:r>
               <a:rPr lang="en-US" altLang="zh-CN" dirty="0" smtClean="0"/>
-              <a:t>Command Line Argument</a:t>
+              <a:t>Task</a:t>
             </a:r>
             <a:endParaRPr lang="zh-CN" altLang="en-US" dirty="0"/>
           </a:p>
@@ -6951,274 +8423,42 @@
             <p:ph idx="1"/>
           </p:nvPr>
         </p:nvSpPr>
-        <p:spPr>
-          <a:xfrm>
-            <a:off x="1218039" y="2780928"/>
-            <a:ext cx="10360501" cy="4462272"/>
-          </a:xfrm>
-        </p:spPr>
+        <p:spPr/>
         <p:txBody>
           <a:bodyPr/>
           <a:lstStyle/>
           <a:p>
             <a:r>
-              <a:rPr lang="en-US" altLang="zh-CN" dirty="0" err="1" smtClean="0"/>
-              <a:t>argc</a:t>
-            </a:r>
-            <a:r>
               <a:rPr lang="en-US" altLang="zh-CN" dirty="0" smtClean="0"/>
-              <a:t>: the </a:t>
-            </a:r>
-            <a:r>
-              <a:rPr lang="en-US" altLang="zh-CN" dirty="0" smtClean="0">
-                <a:solidFill>
-                  <a:srgbClr val="FF0000"/>
-                </a:solidFill>
-              </a:rPr>
-              <a:t>arg</a:t>
+              <a:t>Open a file (plaintext), read content one by one</a:t>
+            </a:r>
+          </a:p>
+          <a:p>
+            <a:r>
+              <a:rPr lang="en-US" altLang="zh-CN" dirty="0"/>
+              <a:t>Encrypt </a:t>
             </a:r>
             <a:r>
               <a:rPr lang="en-US" altLang="zh-CN" dirty="0" smtClean="0"/>
-              <a:t>ument </a:t>
-            </a:r>
-            <a:r>
-              <a:rPr lang="en-US" altLang="zh-CN" dirty="0" smtClean="0">
-                <a:solidFill>
-                  <a:srgbClr val="FF0000"/>
-                </a:solidFill>
-              </a:rPr>
-              <a:t>c</a:t>
-            </a:r>
+              <a:t>the content</a:t>
+            </a:r>
+          </a:p>
+          <a:p>
             <a:r>
               <a:rPr lang="en-US" altLang="zh-CN" dirty="0" smtClean="0"/>
-              <a:t>ount</a:t>
-            </a:r>
-          </a:p>
-          <a:p>
-            <a:r>
-              <a:rPr lang="en-US" altLang="zh-CN" dirty="0" err="1" smtClean="0"/>
-              <a:t>argv</a:t>
-            </a:r>
-            <a:r>
-              <a:rPr lang="en-US" altLang="zh-CN" dirty="0" smtClean="0"/>
-              <a:t>:</a:t>
-            </a:r>
-            <a:r>
-              <a:rPr lang="zh-CN" altLang="en-US" dirty="0"/>
-              <a:t> </a:t>
-            </a:r>
-            <a:r>
-              <a:rPr lang="en-US" altLang="zh-CN" dirty="0" smtClean="0"/>
-              <a:t>a list of the </a:t>
-            </a:r>
-            <a:r>
-              <a:rPr lang="en-US" altLang="zh-CN" dirty="0" smtClean="0">
-                <a:solidFill>
-                  <a:srgbClr val="FF0000"/>
-                </a:solidFill>
-              </a:rPr>
-              <a:t>arg</a:t>
-            </a:r>
-            <a:r>
-              <a:rPr lang="en-US" altLang="zh-CN" dirty="0" smtClean="0"/>
-              <a:t>ument </a:t>
-            </a:r>
-            <a:r>
-              <a:rPr lang="en-US" altLang="zh-CN" dirty="0" smtClean="0">
-                <a:solidFill>
-                  <a:srgbClr val="FF0000"/>
-                </a:solidFill>
-              </a:rPr>
-              <a:t>v</a:t>
-            </a:r>
-            <a:r>
-              <a:rPr lang="en-US" altLang="zh-CN" dirty="0" smtClean="0"/>
-              <a:t>ariables </a:t>
-            </a:r>
-            <a:endParaRPr lang="zh-CN" altLang="en-US" dirty="0"/>
-          </a:p>
-        </p:txBody>
-      </p:sp>
-      <p:sp>
-        <p:nvSpPr>
-          <p:cNvPr id="4" name="矩形 3"/>
-          <p:cNvSpPr/>
-          <p:nvPr/>
-        </p:nvSpPr>
-        <p:spPr>
-          <a:xfrm>
-            <a:off x="1341884" y="2060848"/>
-            <a:ext cx="3959738" cy="461665"/>
-          </a:xfrm>
-          <a:prstGeom prst="rect">
-            <a:avLst/>
-          </a:prstGeom>
-          <a:solidFill>
-            <a:schemeClr val="bg1">
-              <a:lumMod val="85000"/>
-              <a:lumOff val="15000"/>
-            </a:schemeClr>
-          </a:solidFill>
-        </p:spPr>
-        <p:txBody>
-          <a:bodyPr wrap="none">
-            <a:spAutoFit/>
-          </a:bodyPr>
-          <a:lstStyle/>
-          <a:p>
-            <a:r>
-              <a:rPr lang="en-US" altLang="zh-CN" dirty="0">
-                <a:solidFill>
-                  <a:srgbClr val="93C763"/>
-                </a:solidFill>
-                <a:highlight>
-                  <a:srgbClr val="22282A"/>
-                </a:highlight>
-              </a:rPr>
-              <a:t>int</a:t>
-            </a:r>
-            <a:r>
-              <a:rPr lang="en-US" altLang="zh-CN" dirty="0">
-                <a:solidFill>
-                  <a:srgbClr val="F1F2F3"/>
-                </a:solidFill>
-                <a:highlight>
-                  <a:srgbClr val="22282A"/>
-                </a:highlight>
-              </a:rPr>
-              <a:t> </a:t>
-            </a:r>
-            <a:r>
-              <a:rPr lang="en-US" altLang="zh-CN" dirty="0">
-                <a:solidFill>
-                  <a:srgbClr val="F3F2F5"/>
-                </a:solidFill>
-                <a:highlight>
-                  <a:srgbClr val="22282A"/>
-                </a:highlight>
-              </a:rPr>
-              <a:t>main</a:t>
-            </a:r>
-            <a:r>
-              <a:rPr lang="en-US" altLang="zh-CN" dirty="0">
-                <a:solidFill>
-                  <a:srgbClr val="E8E2B7"/>
-                </a:solidFill>
-                <a:highlight>
-                  <a:srgbClr val="22282A"/>
-                </a:highlight>
-              </a:rPr>
-              <a:t>(</a:t>
-            </a:r>
-            <a:r>
-              <a:rPr lang="en-US" altLang="zh-CN" dirty="0">
-                <a:solidFill>
-                  <a:srgbClr val="93C763"/>
-                </a:solidFill>
-                <a:highlight>
-                  <a:srgbClr val="22282A"/>
-                </a:highlight>
-              </a:rPr>
-              <a:t>int</a:t>
-            </a:r>
-            <a:r>
-              <a:rPr lang="en-US" altLang="zh-CN" dirty="0">
-                <a:solidFill>
-                  <a:srgbClr val="F1F2F3"/>
-                </a:solidFill>
-                <a:highlight>
-                  <a:srgbClr val="22282A"/>
-                </a:highlight>
-              </a:rPr>
-              <a:t> </a:t>
-            </a:r>
-            <a:r>
-              <a:rPr lang="en-US" altLang="zh-CN" dirty="0" err="1">
-                <a:solidFill>
-                  <a:srgbClr val="F3F2F5"/>
-                </a:solidFill>
-                <a:highlight>
-                  <a:srgbClr val="22282A"/>
-                </a:highlight>
-              </a:rPr>
-              <a:t>argc</a:t>
-            </a:r>
-            <a:r>
-              <a:rPr lang="en-US" altLang="zh-CN" dirty="0">
-                <a:solidFill>
-                  <a:srgbClr val="E8E2B7"/>
-                </a:solidFill>
-                <a:highlight>
-                  <a:srgbClr val="22282A"/>
-                </a:highlight>
-              </a:rPr>
-              <a:t>,</a:t>
-            </a:r>
-            <a:r>
-              <a:rPr lang="en-US" altLang="zh-CN" dirty="0">
-                <a:solidFill>
-                  <a:srgbClr val="F1F2F3"/>
-                </a:solidFill>
-                <a:highlight>
-                  <a:srgbClr val="22282A"/>
-                </a:highlight>
-              </a:rPr>
-              <a:t> </a:t>
-            </a:r>
-            <a:r>
-              <a:rPr lang="en-US" altLang="zh-CN" dirty="0">
-                <a:solidFill>
-                  <a:srgbClr val="93C763"/>
-                </a:solidFill>
-                <a:highlight>
-                  <a:srgbClr val="22282A"/>
-                </a:highlight>
-              </a:rPr>
-              <a:t>char</a:t>
-            </a:r>
-            <a:r>
-              <a:rPr lang="en-US" altLang="zh-CN" dirty="0">
-                <a:solidFill>
-                  <a:srgbClr val="F1F2F3"/>
-                </a:solidFill>
-                <a:highlight>
-                  <a:srgbClr val="22282A"/>
-                </a:highlight>
-              </a:rPr>
-              <a:t> </a:t>
-            </a:r>
-            <a:r>
-              <a:rPr lang="en-US" altLang="zh-CN" dirty="0">
-                <a:solidFill>
-                  <a:srgbClr val="E8E2B7"/>
-                </a:solidFill>
-                <a:highlight>
-                  <a:srgbClr val="22282A"/>
-                </a:highlight>
-              </a:rPr>
-              <a:t>*</a:t>
-            </a:r>
-            <a:r>
-              <a:rPr lang="en-US" altLang="zh-CN" dirty="0" err="1">
-                <a:solidFill>
-                  <a:srgbClr val="F3F2F5"/>
-                </a:solidFill>
-                <a:highlight>
-                  <a:srgbClr val="22282A"/>
-                </a:highlight>
-              </a:rPr>
-              <a:t>argv</a:t>
-            </a:r>
-            <a:r>
-              <a:rPr lang="en-US" altLang="zh-CN" dirty="0">
-                <a:solidFill>
-                  <a:srgbClr val="E8E2B7"/>
-                </a:solidFill>
-                <a:highlight>
-                  <a:srgbClr val="22282A"/>
-                </a:highlight>
-              </a:rPr>
-              <a:t>[])</a:t>
+              <a:t>Write in another </a:t>
+            </a:r>
+            <a:r>
+              <a:rPr lang="en-US" altLang="zh-CN" dirty="0"/>
+              <a:t>file (</a:t>
+            </a:r>
+            <a:r>
+              <a:rPr lang="en-US" altLang="zh-CN" dirty="0" err="1"/>
+              <a:t>ciphertext</a:t>
+            </a:r>
+            <a:r>
+              <a:rPr lang="en-US" altLang="zh-CN" dirty="0"/>
+              <a:t>)</a:t>
             </a:r>
             <a:endParaRPr lang="zh-CN" altLang="en-US" dirty="0"/>
           </a:p>
@@ -7227,7 +8467,7 @@
     </p:spTree>
     <p:extLst>
       <p:ext uri="{BB962C8B-B14F-4D97-AF65-F5344CB8AC3E}">
-        <p14:creationId xmlns:p14="http://schemas.microsoft.com/office/powerpoint/2010/main" val="3613900083"/>
+        <p14:creationId xmlns:p14="http://schemas.microsoft.com/office/powerpoint/2010/main" val="1498808498"/>
       </p:ext>
     </p:extLst>
   </p:cSld>
@@ -7290,7 +8530,7 @@
           <a:p>
             <a:r>
               <a:rPr lang="en-US" altLang="zh-CN" dirty="0" smtClean="0"/>
-              <a:t>Specify the plaintext file and output file</a:t>
+              <a:t>How to encrypt</a:t>
             </a:r>
             <a:endParaRPr lang="zh-CN" altLang="en-US" dirty="0"/>
           </a:p>
@@ -7298,992 +8538,1102 @@
       </p:sp>
       <p:sp>
         <p:nvSpPr>
-          <p:cNvPr id="4" name="矩形 3"/>
-          <p:cNvSpPr/>
-          <p:nvPr/>
+          <p:cNvPr id="3" name="内容占位符 2"/>
+          <p:cNvSpPr>
+            <a:spLocks noGrp="1"/>
+          </p:cNvSpPr>
+          <p:nvPr>
+            <p:ph idx="1"/>
+          </p:nvPr>
         </p:nvSpPr>
-        <p:spPr>
-          <a:xfrm>
-            <a:off x="1341884" y="1595021"/>
-            <a:ext cx="8447012" cy="5262979"/>
-          </a:xfrm>
-          <a:prstGeom prst="rect">
-            <a:avLst/>
-          </a:prstGeom>
-          <a:solidFill>
-            <a:schemeClr val="bg1">
-              <a:lumMod val="85000"/>
-              <a:lumOff val="15000"/>
-            </a:schemeClr>
-          </a:solidFill>
-        </p:spPr>
+        <p:spPr/>
         <p:txBody>
-          <a:bodyPr wrap="square">
-            <a:spAutoFit/>
-          </a:bodyPr>
+          <a:bodyPr/>
           <a:lstStyle/>
           <a:p>
             <a:r>
-              <a:rPr lang="en-US" altLang="zh-CN" dirty="0">
-                <a:solidFill>
-                  <a:srgbClr val="93C763"/>
-                </a:solidFill>
-                <a:highlight>
-                  <a:srgbClr val="22282A"/>
-                </a:highlight>
-              </a:rPr>
-              <a:t>int</a:t>
-            </a:r>
-            <a:r>
-              <a:rPr lang="en-US" altLang="zh-CN" dirty="0">
-                <a:solidFill>
-                  <a:srgbClr val="F1F2F3"/>
-                </a:solidFill>
-                <a:highlight>
-                  <a:srgbClr val="22282A"/>
-                </a:highlight>
-              </a:rPr>
-              <a:t> </a:t>
-            </a:r>
-            <a:r>
-              <a:rPr lang="en-US" altLang="zh-CN" dirty="0">
-                <a:solidFill>
-                  <a:srgbClr val="F3F2F5"/>
-                </a:solidFill>
-                <a:highlight>
-                  <a:srgbClr val="22282A"/>
-                </a:highlight>
-              </a:rPr>
-              <a:t>main</a:t>
-            </a:r>
-            <a:r>
-              <a:rPr lang="en-US" altLang="zh-CN" dirty="0">
-                <a:solidFill>
-                  <a:srgbClr val="E8E2B7"/>
-                </a:solidFill>
-                <a:highlight>
-                  <a:srgbClr val="22282A"/>
-                </a:highlight>
-              </a:rPr>
-              <a:t>(</a:t>
-            </a:r>
-            <a:r>
-              <a:rPr lang="en-US" altLang="zh-CN" dirty="0">
-                <a:solidFill>
-                  <a:srgbClr val="93C763"/>
-                </a:solidFill>
-                <a:highlight>
-                  <a:srgbClr val="22282A"/>
-                </a:highlight>
-              </a:rPr>
-              <a:t>int</a:t>
-            </a:r>
-            <a:r>
-              <a:rPr lang="en-US" altLang="zh-CN" dirty="0">
-                <a:solidFill>
-                  <a:srgbClr val="F1F2F3"/>
-                </a:solidFill>
-                <a:highlight>
-                  <a:srgbClr val="22282A"/>
-                </a:highlight>
-              </a:rPr>
-              <a:t> </a:t>
-            </a:r>
-            <a:r>
-              <a:rPr lang="en-US" altLang="zh-CN" dirty="0" err="1">
-                <a:solidFill>
-                  <a:srgbClr val="F3F2F5"/>
-                </a:solidFill>
-                <a:highlight>
-                  <a:srgbClr val="22282A"/>
-                </a:highlight>
-              </a:rPr>
-              <a:t>argc</a:t>
-            </a:r>
-            <a:r>
-              <a:rPr lang="en-US" altLang="zh-CN" dirty="0">
-                <a:solidFill>
-                  <a:srgbClr val="E8E2B7"/>
-                </a:solidFill>
-                <a:highlight>
-                  <a:srgbClr val="22282A"/>
-                </a:highlight>
-              </a:rPr>
-              <a:t>,</a:t>
-            </a:r>
-            <a:r>
-              <a:rPr lang="en-US" altLang="zh-CN" dirty="0">
-                <a:solidFill>
-                  <a:srgbClr val="F1F2F3"/>
-                </a:solidFill>
-                <a:highlight>
-                  <a:srgbClr val="22282A"/>
-                </a:highlight>
-              </a:rPr>
-              <a:t> </a:t>
-            </a:r>
-            <a:r>
-              <a:rPr lang="en-US" altLang="zh-CN" dirty="0">
-                <a:solidFill>
-                  <a:srgbClr val="93C763"/>
-                </a:solidFill>
-                <a:highlight>
-                  <a:srgbClr val="22282A"/>
-                </a:highlight>
-              </a:rPr>
-              <a:t>char</a:t>
-            </a:r>
-            <a:r>
-              <a:rPr lang="en-US" altLang="zh-CN" dirty="0">
-                <a:solidFill>
-                  <a:srgbClr val="E8E2B7"/>
-                </a:solidFill>
-                <a:highlight>
-                  <a:srgbClr val="22282A"/>
-                </a:highlight>
-              </a:rPr>
-              <a:t>*</a:t>
-            </a:r>
-            <a:r>
-              <a:rPr lang="en-US" altLang="zh-CN" dirty="0">
-                <a:solidFill>
-                  <a:srgbClr val="F1F2F3"/>
-                </a:solidFill>
-                <a:highlight>
-                  <a:srgbClr val="22282A"/>
-                </a:highlight>
-              </a:rPr>
-              <a:t> </a:t>
-            </a:r>
-            <a:r>
-              <a:rPr lang="en-US" altLang="zh-CN" dirty="0" err="1">
-                <a:solidFill>
-                  <a:srgbClr val="F3F2F5"/>
-                </a:solidFill>
-                <a:highlight>
-                  <a:srgbClr val="22282A"/>
-                </a:highlight>
-              </a:rPr>
-              <a:t>argv</a:t>
-            </a:r>
-            <a:r>
-              <a:rPr lang="en-US" altLang="zh-CN" dirty="0">
-                <a:solidFill>
-                  <a:srgbClr val="E8E2B7"/>
-                </a:solidFill>
-                <a:highlight>
-                  <a:srgbClr val="22282A"/>
-                </a:highlight>
-              </a:rPr>
-              <a:t>[])</a:t>
-            </a:r>
-          </a:p>
-          <a:p>
-            <a:r>
-              <a:rPr lang="en-US" altLang="zh-CN" dirty="0">
-                <a:solidFill>
-                  <a:srgbClr val="E8E2B7"/>
-                </a:solidFill>
-                <a:highlight>
-                  <a:srgbClr val="22282A"/>
-                </a:highlight>
-              </a:rPr>
-              <a:t>{</a:t>
-            </a:r>
-          </a:p>
-          <a:p>
-            <a:r>
-              <a:rPr lang="en-US" altLang="zh-CN" dirty="0">
-                <a:solidFill>
-                  <a:srgbClr val="F1F2F3"/>
-                </a:solidFill>
-                <a:highlight>
-                  <a:srgbClr val="22282A"/>
-                </a:highlight>
-              </a:rPr>
-              <a:t>	</a:t>
-            </a:r>
-            <a:r>
-              <a:rPr lang="en-US" altLang="zh-CN" dirty="0">
-                <a:solidFill>
-                  <a:srgbClr val="93C763"/>
-                </a:solidFill>
-                <a:highlight>
-                  <a:srgbClr val="22282A"/>
-                </a:highlight>
-              </a:rPr>
-              <a:t>if</a:t>
-            </a:r>
-            <a:r>
-              <a:rPr lang="en-US" altLang="zh-CN" dirty="0">
-                <a:solidFill>
-                  <a:srgbClr val="E8E2B7"/>
-                </a:solidFill>
-                <a:highlight>
-                  <a:srgbClr val="22282A"/>
-                </a:highlight>
-              </a:rPr>
-              <a:t>(</a:t>
-            </a:r>
-            <a:r>
-              <a:rPr lang="en-US" altLang="zh-CN" dirty="0" err="1">
-                <a:solidFill>
-                  <a:srgbClr val="F3F2F5"/>
-                </a:solidFill>
-                <a:highlight>
-                  <a:srgbClr val="22282A"/>
-                </a:highlight>
-              </a:rPr>
-              <a:t>argc</a:t>
-            </a:r>
-            <a:r>
-              <a:rPr lang="en-US" altLang="zh-CN" dirty="0">
-                <a:solidFill>
-                  <a:srgbClr val="F1F2F3"/>
-                </a:solidFill>
-                <a:highlight>
-                  <a:srgbClr val="22282A"/>
-                </a:highlight>
-              </a:rPr>
-              <a:t> </a:t>
-            </a:r>
-            <a:r>
-              <a:rPr lang="en-US" altLang="zh-CN" dirty="0">
-                <a:solidFill>
-                  <a:srgbClr val="E8E2B7"/>
-                </a:solidFill>
-                <a:highlight>
-                  <a:srgbClr val="22282A"/>
-                </a:highlight>
-              </a:rPr>
-              <a:t>!=</a:t>
-            </a:r>
-            <a:r>
-              <a:rPr lang="en-US" altLang="zh-CN" dirty="0">
-                <a:solidFill>
-                  <a:srgbClr val="F1F2F3"/>
-                </a:solidFill>
-                <a:highlight>
-                  <a:srgbClr val="22282A"/>
-                </a:highlight>
-              </a:rPr>
-              <a:t> </a:t>
-            </a:r>
-            <a:r>
-              <a:rPr lang="en-US" altLang="zh-CN" dirty="0">
-                <a:solidFill>
-                  <a:srgbClr val="FFCD22"/>
-                </a:solidFill>
-                <a:highlight>
-                  <a:srgbClr val="22282A"/>
-                </a:highlight>
-              </a:rPr>
-              <a:t>3</a:t>
-            </a:r>
-            <a:r>
-              <a:rPr lang="en-US" altLang="zh-CN" dirty="0">
-                <a:solidFill>
-                  <a:srgbClr val="E8E2B7"/>
-                </a:solidFill>
-                <a:highlight>
-                  <a:srgbClr val="22282A"/>
-                </a:highlight>
-              </a:rPr>
-              <a:t>)</a:t>
-            </a:r>
-          </a:p>
-          <a:p>
-            <a:r>
-              <a:rPr lang="zh-CN" altLang="en-US" dirty="0">
-                <a:solidFill>
-                  <a:srgbClr val="F1F2F3"/>
-                </a:solidFill>
-                <a:highlight>
-                  <a:srgbClr val="22282A"/>
-                </a:highlight>
-              </a:rPr>
-              <a:t>	</a:t>
-            </a:r>
-            <a:r>
-              <a:rPr lang="en-US" altLang="zh-CN" dirty="0">
-                <a:solidFill>
-                  <a:srgbClr val="E8E2B7"/>
-                </a:solidFill>
-                <a:highlight>
-                  <a:srgbClr val="22282A"/>
-                </a:highlight>
-              </a:rPr>
-              <a:t>{</a:t>
-            </a:r>
-          </a:p>
-          <a:p>
-            <a:r>
-              <a:rPr lang="en-US" altLang="zh-CN" dirty="0">
-                <a:solidFill>
-                  <a:srgbClr val="F1F2F3"/>
-                </a:solidFill>
-                <a:highlight>
-                  <a:srgbClr val="22282A"/>
-                </a:highlight>
-              </a:rPr>
-              <a:t>		</a:t>
-            </a:r>
-            <a:r>
-              <a:rPr lang="en-US" altLang="zh-CN" dirty="0" err="1">
-                <a:solidFill>
-                  <a:srgbClr val="F3F2F5"/>
-                </a:solidFill>
-                <a:highlight>
-                  <a:srgbClr val="22282A"/>
-                </a:highlight>
-              </a:rPr>
-              <a:t>printf</a:t>
-            </a:r>
-            <a:r>
-              <a:rPr lang="en-US" altLang="zh-CN" dirty="0">
-                <a:solidFill>
-                  <a:srgbClr val="E8E2B7"/>
-                </a:solidFill>
-                <a:highlight>
-                  <a:srgbClr val="22282A"/>
-                </a:highlight>
-              </a:rPr>
-              <a:t>(</a:t>
-            </a:r>
-            <a:r>
-              <a:rPr lang="en-US" altLang="zh-CN" dirty="0">
-                <a:solidFill>
-                  <a:srgbClr val="EC7600"/>
-                </a:solidFill>
-                <a:highlight>
-                  <a:srgbClr val="22282A"/>
-                </a:highlight>
-              </a:rPr>
-              <a:t>"usage: %s plaintext </a:t>
-            </a:r>
-            <a:r>
-              <a:rPr lang="en-US" altLang="zh-CN" dirty="0" err="1">
-                <a:solidFill>
-                  <a:srgbClr val="EC7600"/>
-                </a:solidFill>
-                <a:highlight>
-                  <a:srgbClr val="22282A"/>
-                </a:highlight>
-              </a:rPr>
-              <a:t>outfile</a:t>
-            </a:r>
-            <a:r>
-              <a:rPr lang="en-US" altLang="zh-CN" dirty="0">
-                <a:solidFill>
-                  <a:srgbClr val="EC7600"/>
-                </a:solidFill>
-                <a:highlight>
-                  <a:srgbClr val="22282A"/>
-                </a:highlight>
-              </a:rPr>
-              <a:t>"</a:t>
-            </a:r>
-            <a:r>
-              <a:rPr lang="en-US" altLang="zh-CN" dirty="0">
-                <a:solidFill>
-                  <a:srgbClr val="E8E2B7"/>
-                </a:solidFill>
-                <a:highlight>
-                  <a:srgbClr val="22282A"/>
-                </a:highlight>
-              </a:rPr>
-              <a:t>,</a:t>
-            </a:r>
-            <a:r>
-              <a:rPr lang="en-US" altLang="zh-CN" dirty="0" err="1">
-                <a:solidFill>
-                  <a:srgbClr val="F3F2F5"/>
-                </a:solidFill>
-                <a:highlight>
-                  <a:srgbClr val="22282A"/>
-                </a:highlight>
-              </a:rPr>
-              <a:t>argv</a:t>
-            </a:r>
-            <a:r>
-              <a:rPr lang="en-US" altLang="zh-CN" dirty="0">
-                <a:solidFill>
-                  <a:srgbClr val="E8E2B7"/>
-                </a:solidFill>
-                <a:highlight>
-                  <a:srgbClr val="22282A"/>
-                </a:highlight>
-              </a:rPr>
-              <a:t>[</a:t>
-            </a:r>
-            <a:r>
-              <a:rPr lang="en-US" altLang="zh-CN" dirty="0">
-                <a:solidFill>
-                  <a:srgbClr val="FFCD22"/>
-                </a:solidFill>
-                <a:highlight>
-                  <a:srgbClr val="22282A"/>
-                </a:highlight>
-              </a:rPr>
-              <a:t>0</a:t>
-            </a:r>
-            <a:r>
-              <a:rPr lang="en-US" altLang="zh-CN" dirty="0">
-                <a:solidFill>
-                  <a:srgbClr val="E8E2B7"/>
-                </a:solidFill>
-                <a:highlight>
-                  <a:srgbClr val="22282A"/>
-                </a:highlight>
-              </a:rPr>
-              <a:t>]);</a:t>
-            </a:r>
-          </a:p>
-          <a:p>
-            <a:r>
-              <a:rPr lang="zh-CN" altLang="en-US" dirty="0">
-                <a:solidFill>
-                  <a:srgbClr val="F1F2F3"/>
-                </a:solidFill>
-                <a:highlight>
-                  <a:srgbClr val="22282A"/>
-                </a:highlight>
-              </a:rPr>
-              <a:t>	</a:t>
-            </a:r>
-            <a:r>
-              <a:rPr lang="en-US" altLang="zh-CN" dirty="0">
-                <a:solidFill>
-                  <a:srgbClr val="E8E2B7"/>
-                </a:solidFill>
-                <a:highlight>
-                  <a:srgbClr val="22282A"/>
-                </a:highlight>
-              </a:rPr>
-              <a:t>}</a:t>
-            </a:r>
-          </a:p>
-          <a:p>
-            <a:r>
-              <a:rPr lang="en-US" altLang="zh-CN" dirty="0">
-                <a:solidFill>
-                  <a:srgbClr val="F1F2F3"/>
-                </a:solidFill>
-                <a:highlight>
-                  <a:srgbClr val="22282A"/>
-                </a:highlight>
-              </a:rPr>
-              <a:t>	</a:t>
-            </a:r>
-            <a:r>
-              <a:rPr lang="en-US" altLang="zh-CN" dirty="0">
-                <a:solidFill>
-                  <a:srgbClr val="93C763"/>
-                </a:solidFill>
-                <a:highlight>
-                  <a:srgbClr val="22282A"/>
-                </a:highlight>
-              </a:rPr>
-              <a:t>else</a:t>
-            </a:r>
-          </a:p>
-          <a:p>
-            <a:r>
-              <a:rPr lang="zh-CN" altLang="en-US" dirty="0">
-                <a:solidFill>
-                  <a:srgbClr val="F1F2F3"/>
-                </a:solidFill>
-                <a:highlight>
-                  <a:srgbClr val="22282A"/>
-                </a:highlight>
-              </a:rPr>
-              <a:t>	</a:t>
-            </a:r>
-            <a:r>
-              <a:rPr lang="en-US" altLang="zh-CN" dirty="0">
-                <a:solidFill>
-                  <a:srgbClr val="E8E2B7"/>
-                </a:solidFill>
-                <a:highlight>
-                  <a:srgbClr val="22282A"/>
-                </a:highlight>
-              </a:rPr>
-              <a:t>{</a:t>
-            </a:r>
-          </a:p>
-          <a:p>
-            <a:r>
-              <a:rPr lang="en-US" altLang="zh-CN" dirty="0">
-                <a:solidFill>
-                  <a:srgbClr val="F1F2F3"/>
-                </a:solidFill>
-                <a:highlight>
-                  <a:srgbClr val="22282A"/>
-                </a:highlight>
-              </a:rPr>
-              <a:t>		</a:t>
-            </a:r>
-            <a:r>
-              <a:rPr lang="en-US" altLang="zh-CN" dirty="0">
-                <a:solidFill>
-                  <a:srgbClr val="F3F2F5"/>
-                </a:solidFill>
-                <a:highlight>
-                  <a:srgbClr val="22282A"/>
-                </a:highlight>
-              </a:rPr>
-              <a:t>FILE</a:t>
-            </a:r>
-            <a:r>
-              <a:rPr lang="en-US" altLang="zh-CN" dirty="0">
-                <a:solidFill>
-                  <a:srgbClr val="F1F2F3"/>
-                </a:solidFill>
-                <a:highlight>
-                  <a:srgbClr val="22282A"/>
-                </a:highlight>
-              </a:rPr>
-              <a:t> </a:t>
-            </a:r>
-            <a:r>
-              <a:rPr lang="en-US" altLang="zh-CN" dirty="0">
-                <a:solidFill>
-                  <a:srgbClr val="E8E2B7"/>
-                </a:solidFill>
-                <a:highlight>
-                  <a:srgbClr val="22282A"/>
-                </a:highlight>
-              </a:rPr>
-              <a:t>*</a:t>
-            </a:r>
-            <a:r>
-              <a:rPr lang="en-US" altLang="zh-CN" dirty="0">
-                <a:solidFill>
-                  <a:srgbClr val="F3F2F5"/>
-                </a:solidFill>
-                <a:highlight>
-                  <a:srgbClr val="22282A"/>
-                </a:highlight>
-              </a:rPr>
-              <a:t>plaintext</a:t>
-            </a:r>
-            <a:r>
-              <a:rPr lang="en-US" altLang="zh-CN" dirty="0">
-                <a:solidFill>
-                  <a:srgbClr val="F1F2F3"/>
-                </a:solidFill>
-                <a:highlight>
-                  <a:srgbClr val="22282A"/>
-                </a:highlight>
-              </a:rPr>
-              <a:t>	</a:t>
+              <a:rPr lang="en-US" altLang="zh-CN" dirty="0" smtClean="0"/>
+              <a:t>Shift letters</a:t>
+            </a:r>
+          </a:p>
+          <a:p>
+            <a:r>
+              <a:rPr lang="en-US" altLang="zh-CN" dirty="0" smtClean="0"/>
+              <a:t>e.g.</a:t>
+            </a:r>
+          </a:p>
+          <a:p>
+            <a:pPr lvl="1"/>
+            <a:r>
+              <a:rPr lang="en-US" altLang="zh-CN" dirty="0" smtClean="0"/>
+              <a:t>key: T(19)</a:t>
+            </a:r>
+          </a:p>
+          <a:p>
+            <a:pPr lvl="1"/>
+            <a:endParaRPr lang="en-US" altLang="zh-CN" dirty="0"/>
+          </a:p>
+          <a:p>
+            <a:pPr lvl="1"/>
+            <a:r>
+              <a:rPr lang="en-US" altLang="zh-CN" dirty="0" smtClean="0"/>
+              <a:t>HELLO----------</a:t>
             </a:r>
             <a:r>
               <a:rPr lang="en-US" altLang="zh-CN" dirty="0" smtClean="0">
-                <a:solidFill>
-                  <a:srgbClr val="E8E2B7"/>
-                </a:solidFill>
-                <a:highlight>
-                  <a:srgbClr val="22282A"/>
-                </a:highlight>
-              </a:rPr>
-              <a:t>=</a:t>
-            </a:r>
-            <a:r>
-              <a:rPr lang="en-US" altLang="zh-CN" dirty="0" smtClean="0">
-                <a:solidFill>
-                  <a:srgbClr val="F1F2F3"/>
-                </a:solidFill>
-                <a:highlight>
-                  <a:srgbClr val="22282A"/>
-                </a:highlight>
-              </a:rPr>
-              <a:t> </a:t>
-            </a:r>
-            <a:r>
-              <a:rPr lang="en-US" altLang="zh-CN" dirty="0" err="1">
-                <a:solidFill>
-                  <a:srgbClr val="F3F2F5"/>
-                </a:solidFill>
-                <a:highlight>
-                  <a:srgbClr val="22282A"/>
-                </a:highlight>
-              </a:rPr>
-              <a:t>fopen</a:t>
-            </a:r>
-            <a:r>
-              <a:rPr lang="en-US" altLang="zh-CN" dirty="0">
-                <a:solidFill>
-                  <a:srgbClr val="E8E2B7"/>
-                </a:solidFill>
-                <a:highlight>
-                  <a:srgbClr val="22282A"/>
-                </a:highlight>
-              </a:rPr>
-              <a:t>(</a:t>
-            </a:r>
-            <a:r>
-              <a:rPr lang="en-US" altLang="zh-CN" dirty="0" err="1">
-                <a:solidFill>
-                  <a:srgbClr val="F3F2F5"/>
-                </a:solidFill>
-                <a:highlight>
-                  <a:srgbClr val="22282A"/>
-                </a:highlight>
-              </a:rPr>
-              <a:t>argv</a:t>
-            </a:r>
-            <a:r>
-              <a:rPr lang="en-US" altLang="zh-CN" dirty="0">
-                <a:solidFill>
-                  <a:srgbClr val="E8E2B7"/>
-                </a:solidFill>
-                <a:highlight>
-                  <a:srgbClr val="22282A"/>
-                </a:highlight>
-              </a:rPr>
-              <a:t>[</a:t>
-            </a:r>
-            <a:r>
-              <a:rPr lang="en-US" altLang="zh-CN" dirty="0">
-                <a:solidFill>
-                  <a:srgbClr val="FFCD22"/>
-                </a:solidFill>
-                <a:highlight>
-                  <a:srgbClr val="22282A"/>
-                </a:highlight>
-              </a:rPr>
-              <a:t>1</a:t>
-            </a:r>
-            <a:r>
-              <a:rPr lang="en-US" altLang="zh-CN" dirty="0">
-                <a:solidFill>
-                  <a:srgbClr val="E8E2B7"/>
-                </a:solidFill>
-                <a:highlight>
-                  <a:srgbClr val="22282A"/>
-                </a:highlight>
-              </a:rPr>
-              <a:t>],</a:t>
-            </a:r>
-            <a:r>
-              <a:rPr lang="en-US" altLang="zh-CN" dirty="0">
-                <a:solidFill>
-                  <a:srgbClr val="EC7600"/>
-                </a:solidFill>
-                <a:highlight>
-                  <a:srgbClr val="22282A"/>
-                </a:highlight>
-              </a:rPr>
-              <a:t>"r"</a:t>
-            </a:r>
-            <a:r>
-              <a:rPr lang="en-US" altLang="zh-CN" dirty="0">
-                <a:solidFill>
-                  <a:srgbClr val="E8E2B7"/>
-                </a:solidFill>
-                <a:highlight>
-                  <a:srgbClr val="22282A"/>
-                </a:highlight>
-              </a:rPr>
-              <a:t>);</a:t>
-            </a:r>
-          </a:p>
-          <a:p>
-            <a:r>
-              <a:rPr lang="en-US" altLang="zh-CN" dirty="0">
-                <a:solidFill>
-                  <a:srgbClr val="F1F2F3"/>
-                </a:solidFill>
-                <a:highlight>
-                  <a:srgbClr val="22282A"/>
-                </a:highlight>
-              </a:rPr>
-              <a:t>		</a:t>
-            </a:r>
-            <a:r>
-              <a:rPr lang="en-US" altLang="zh-CN" dirty="0">
-                <a:solidFill>
-                  <a:srgbClr val="F3F2F5"/>
-                </a:solidFill>
-                <a:highlight>
-                  <a:srgbClr val="22282A"/>
-                </a:highlight>
-              </a:rPr>
-              <a:t>FILE</a:t>
-            </a:r>
-            <a:r>
-              <a:rPr lang="en-US" altLang="zh-CN" dirty="0">
-                <a:solidFill>
-                  <a:srgbClr val="F1F2F3"/>
-                </a:solidFill>
-                <a:highlight>
-                  <a:srgbClr val="22282A"/>
-                </a:highlight>
-              </a:rPr>
-              <a:t> </a:t>
-            </a:r>
-            <a:r>
-              <a:rPr lang="en-US" altLang="zh-CN" dirty="0">
-                <a:solidFill>
-                  <a:srgbClr val="E8E2B7"/>
-                </a:solidFill>
-                <a:highlight>
-                  <a:srgbClr val="22282A"/>
-                </a:highlight>
-              </a:rPr>
-              <a:t>*</a:t>
-            </a:r>
-            <a:r>
-              <a:rPr lang="en-US" altLang="zh-CN" dirty="0" err="1">
-                <a:solidFill>
-                  <a:srgbClr val="F3F2F5"/>
-                </a:solidFill>
-                <a:highlight>
-                  <a:srgbClr val="22282A"/>
-                </a:highlight>
-              </a:rPr>
-              <a:t>ciphertext</a:t>
-            </a:r>
-            <a:r>
-              <a:rPr lang="en-US" altLang="zh-CN" dirty="0">
-                <a:solidFill>
-                  <a:srgbClr val="F1F2F3"/>
-                </a:solidFill>
-                <a:highlight>
-                  <a:srgbClr val="22282A"/>
-                </a:highlight>
-              </a:rPr>
-              <a:t>	</a:t>
-            </a:r>
-            <a:r>
-              <a:rPr lang="en-US" altLang="zh-CN" dirty="0">
-                <a:solidFill>
-                  <a:srgbClr val="E8E2B7"/>
-                </a:solidFill>
-                <a:highlight>
-                  <a:srgbClr val="22282A"/>
-                </a:highlight>
-              </a:rPr>
-              <a:t>=</a:t>
-            </a:r>
-            <a:r>
-              <a:rPr lang="en-US" altLang="zh-CN" dirty="0">
-                <a:solidFill>
-                  <a:srgbClr val="F1F2F3"/>
-                </a:solidFill>
-                <a:highlight>
-                  <a:srgbClr val="22282A"/>
-                </a:highlight>
-              </a:rPr>
-              <a:t> </a:t>
-            </a:r>
-            <a:r>
-              <a:rPr lang="en-US" altLang="zh-CN" dirty="0" err="1">
-                <a:solidFill>
-                  <a:srgbClr val="F3F2F5"/>
-                </a:solidFill>
-                <a:highlight>
-                  <a:srgbClr val="22282A"/>
-                </a:highlight>
-              </a:rPr>
-              <a:t>fopen</a:t>
-            </a:r>
-            <a:r>
-              <a:rPr lang="en-US" altLang="zh-CN" dirty="0">
-                <a:solidFill>
-                  <a:srgbClr val="E8E2B7"/>
-                </a:solidFill>
-                <a:highlight>
-                  <a:srgbClr val="22282A"/>
-                </a:highlight>
-              </a:rPr>
-              <a:t>(</a:t>
-            </a:r>
-            <a:r>
-              <a:rPr lang="en-US" altLang="zh-CN" dirty="0" err="1">
-                <a:solidFill>
-                  <a:srgbClr val="F3F2F5"/>
-                </a:solidFill>
-                <a:highlight>
-                  <a:srgbClr val="22282A"/>
-                </a:highlight>
-              </a:rPr>
-              <a:t>argv</a:t>
-            </a:r>
-            <a:r>
-              <a:rPr lang="en-US" altLang="zh-CN" dirty="0">
-                <a:solidFill>
-                  <a:srgbClr val="E8E2B7"/>
-                </a:solidFill>
-                <a:highlight>
-                  <a:srgbClr val="22282A"/>
-                </a:highlight>
-              </a:rPr>
-              <a:t>[</a:t>
-            </a:r>
-            <a:r>
-              <a:rPr lang="en-US" altLang="zh-CN" dirty="0">
-                <a:solidFill>
-                  <a:srgbClr val="FFCD22"/>
-                </a:solidFill>
-                <a:highlight>
-                  <a:srgbClr val="22282A"/>
-                </a:highlight>
-              </a:rPr>
-              <a:t>2</a:t>
-            </a:r>
-            <a:r>
-              <a:rPr lang="en-US" altLang="zh-CN" dirty="0">
-                <a:solidFill>
-                  <a:srgbClr val="E8E2B7"/>
-                </a:solidFill>
-                <a:highlight>
-                  <a:srgbClr val="22282A"/>
-                </a:highlight>
-              </a:rPr>
-              <a:t>],</a:t>
-            </a:r>
-            <a:r>
-              <a:rPr lang="en-US" altLang="zh-CN" dirty="0">
-                <a:solidFill>
-                  <a:srgbClr val="EC7600"/>
-                </a:solidFill>
-                <a:highlight>
-                  <a:srgbClr val="22282A"/>
-                </a:highlight>
-              </a:rPr>
-              <a:t>"w</a:t>
-            </a:r>
-            <a:r>
-              <a:rPr lang="en-US" altLang="zh-CN" dirty="0" smtClean="0">
-                <a:solidFill>
-                  <a:srgbClr val="EC7600"/>
-                </a:solidFill>
-                <a:highlight>
-                  <a:srgbClr val="22282A"/>
-                </a:highlight>
-              </a:rPr>
-              <a:t>"</a:t>
-            </a:r>
-            <a:r>
-              <a:rPr lang="en-US" altLang="zh-CN" dirty="0" smtClean="0">
-                <a:solidFill>
-                  <a:srgbClr val="E8E2B7"/>
-                </a:solidFill>
-                <a:highlight>
-                  <a:srgbClr val="22282A"/>
-                </a:highlight>
-              </a:rPr>
-              <a:t>);</a:t>
-            </a:r>
-          </a:p>
-          <a:p>
-            <a:r>
-              <a:rPr lang="en-US" altLang="zh-CN" dirty="0">
-                <a:solidFill>
-                  <a:srgbClr val="E8E2B7"/>
-                </a:solidFill>
-                <a:highlight>
-                  <a:srgbClr val="22282A"/>
-                </a:highlight>
-              </a:rPr>
-              <a:t>	</a:t>
-            </a:r>
-            <a:r>
-              <a:rPr lang="en-US" altLang="zh-CN" dirty="0" smtClean="0">
-                <a:solidFill>
-                  <a:srgbClr val="E8E2B7"/>
-                </a:solidFill>
-                <a:highlight>
-                  <a:srgbClr val="22282A"/>
-                </a:highlight>
-              </a:rPr>
-              <a:t>	…</a:t>
-            </a:r>
-          </a:p>
-          <a:p>
-            <a:r>
-              <a:rPr lang="en-US" altLang="zh-CN" dirty="0" smtClean="0">
-                <a:solidFill>
-                  <a:srgbClr val="E8E2B7"/>
-                </a:solidFill>
-                <a:highlight>
-                  <a:srgbClr val="22282A"/>
-                </a:highlight>
-              </a:rPr>
-              <a:t>	}</a:t>
-            </a:r>
-          </a:p>
-          <a:p>
-            <a:r>
-              <a:rPr lang="en-US" altLang="zh-CN" dirty="0">
-                <a:solidFill>
-                  <a:srgbClr val="E8E2B7"/>
-                </a:solidFill>
-                <a:highlight>
-                  <a:srgbClr val="22282A"/>
-                </a:highlight>
-              </a:rPr>
-              <a:t>	</a:t>
-            </a:r>
-            <a:r>
-              <a:rPr lang="en-US" altLang="zh-CN" dirty="0" smtClean="0">
-                <a:solidFill>
-                  <a:srgbClr val="E8E2B7"/>
-                </a:solidFill>
-                <a:highlight>
-                  <a:srgbClr val="22282A"/>
-                </a:highlight>
-              </a:rPr>
-              <a:t>return 0;</a:t>
-            </a:r>
-          </a:p>
-          <a:p>
-            <a:r>
-              <a:rPr lang="en-US" altLang="zh-CN" dirty="0">
-                <a:solidFill>
-                  <a:srgbClr val="E8E2B7"/>
-                </a:solidFill>
-                <a:highlight>
-                  <a:srgbClr val="22282A"/>
-                </a:highlight>
-              </a:rPr>
-              <a:t>}</a:t>
-            </a:r>
+                <a:sym typeface="Wingdings" panose="05000000000000000000" pitchFamily="2" charset="2"/>
+              </a:rPr>
+              <a:t>AXEEH</a:t>
+            </a:r>
+            <a:endParaRPr lang="en-US" altLang="zh-CN" dirty="0" smtClean="0"/>
+          </a:p>
+          <a:p>
+            <a:pPr lvl="1"/>
+            <a:endParaRPr lang="en-US" altLang="zh-CN" dirty="0" smtClean="0"/>
+          </a:p>
+          <a:p>
+            <a:pPr lvl="1"/>
+            <a:endParaRPr lang="en-US" altLang="zh-CN" dirty="0"/>
+          </a:p>
+          <a:p>
+            <a:pPr marL="377886" lvl="1" indent="0">
+              <a:buNone/>
+            </a:pPr>
+            <a:endParaRPr lang="en-US" altLang="zh-CN" dirty="0"/>
+          </a:p>
+          <a:p>
+            <a:pPr marL="377886" lvl="1" indent="0">
+              <a:buNone/>
+            </a:pPr>
+            <a:endParaRPr lang="en-US" altLang="zh-CN" dirty="0" smtClean="0"/>
+          </a:p>
+          <a:p>
+            <a:pPr lvl="1"/>
             <a:endParaRPr lang="zh-CN" altLang="en-US" dirty="0"/>
           </a:p>
         </p:txBody>
       </p:sp>
+      <p:graphicFrame>
+        <p:nvGraphicFramePr>
+          <p:cNvPr id="4" name="表格 3"/>
+          <p:cNvGraphicFramePr>
+            <a:graphicFrameLocks noGrp="1"/>
+          </p:cNvGraphicFramePr>
+          <p:nvPr>
+            <p:extLst>
+              <p:ext uri="{D42A27DB-BD31-4B8C-83A1-F6EECF244321}">
+                <p14:modId xmlns:p14="http://schemas.microsoft.com/office/powerpoint/2010/main" val="3817364594"/>
+              </p:ext>
+            </p:extLst>
+          </p:nvPr>
+        </p:nvGraphicFramePr>
+        <p:xfrm>
+          <a:off x="3358108" y="2276872"/>
+          <a:ext cx="8640970" cy="1280160"/>
+        </p:xfrm>
+        <a:graphic>
+          <a:graphicData uri="http://schemas.openxmlformats.org/drawingml/2006/table">
+            <a:tbl>
+              <a:tblPr firstRow="1" bandRow="1">
+                <a:tableStyleId>{5940675A-B579-460E-94D1-54222C63F5DA}</a:tableStyleId>
+              </a:tblPr>
+              <a:tblGrid>
+                <a:gridCol w="332345"/>
+                <a:gridCol w="332345"/>
+                <a:gridCol w="332345"/>
+                <a:gridCol w="332345"/>
+                <a:gridCol w="332345"/>
+                <a:gridCol w="332345"/>
+                <a:gridCol w="332345"/>
+                <a:gridCol w="332345"/>
+                <a:gridCol w="332345"/>
+                <a:gridCol w="332345"/>
+                <a:gridCol w="332345"/>
+                <a:gridCol w="332345"/>
+                <a:gridCol w="332345"/>
+                <a:gridCol w="332345"/>
+                <a:gridCol w="332345"/>
+                <a:gridCol w="332345"/>
+                <a:gridCol w="332345"/>
+                <a:gridCol w="332345"/>
+                <a:gridCol w="332345"/>
+                <a:gridCol w="332345"/>
+                <a:gridCol w="332345"/>
+                <a:gridCol w="332345"/>
+                <a:gridCol w="332345"/>
+                <a:gridCol w="332345"/>
+                <a:gridCol w="332345"/>
+                <a:gridCol w="332345"/>
+              </a:tblGrid>
+              <a:tr h="396044">
+                <a:tc>
+                  <a:txBody>
+                    <a:bodyPr/>
+                    <a:lstStyle/>
+                    <a:p>
+                      <a:r>
+                        <a:rPr lang="en-US" altLang="zh-CN" dirty="0" smtClean="0"/>
+                        <a:t>A</a:t>
+                      </a:r>
+                      <a:endParaRPr lang="zh-CN" altLang="en-US" dirty="0"/>
+                    </a:p>
+                  </a:txBody>
+                  <a:tcPr/>
+                </a:tc>
+                <a:tc>
+                  <a:txBody>
+                    <a:bodyPr/>
+                    <a:lstStyle/>
+                    <a:p>
+                      <a:r>
+                        <a:rPr lang="en-US" altLang="zh-CN" dirty="0" smtClean="0"/>
+                        <a:t>B</a:t>
+                      </a:r>
+                      <a:endParaRPr lang="zh-CN" altLang="en-US" dirty="0"/>
+                    </a:p>
+                  </a:txBody>
+                  <a:tcPr/>
+                </a:tc>
+                <a:tc>
+                  <a:txBody>
+                    <a:bodyPr/>
+                    <a:lstStyle/>
+                    <a:p>
+                      <a:r>
+                        <a:rPr lang="en-US" altLang="zh-CN" dirty="0" smtClean="0"/>
+                        <a:t>C</a:t>
+                      </a:r>
+                      <a:endParaRPr lang="zh-CN" altLang="en-US" dirty="0"/>
+                    </a:p>
+                  </a:txBody>
+                  <a:tcPr/>
+                </a:tc>
+                <a:tc>
+                  <a:txBody>
+                    <a:bodyPr/>
+                    <a:lstStyle/>
+                    <a:p>
+                      <a:r>
+                        <a:rPr lang="en-US" altLang="zh-CN" dirty="0" smtClean="0"/>
+                        <a:t>D</a:t>
+                      </a:r>
+                      <a:endParaRPr lang="zh-CN" altLang="en-US" dirty="0"/>
+                    </a:p>
+                  </a:txBody>
+                  <a:tcPr/>
+                </a:tc>
+                <a:tc>
+                  <a:txBody>
+                    <a:bodyPr/>
+                    <a:lstStyle/>
+                    <a:p>
+                      <a:r>
+                        <a:rPr lang="en-US" altLang="zh-CN" dirty="0" smtClean="0"/>
+                        <a:t>E</a:t>
+                      </a:r>
+                      <a:endParaRPr lang="zh-CN" altLang="en-US" dirty="0"/>
+                    </a:p>
+                  </a:txBody>
+                  <a:tcPr/>
+                </a:tc>
+                <a:tc>
+                  <a:txBody>
+                    <a:bodyPr/>
+                    <a:lstStyle/>
+                    <a:p>
+                      <a:r>
+                        <a:rPr lang="en-US" altLang="zh-CN" dirty="0" smtClean="0"/>
+                        <a:t>F</a:t>
+                      </a:r>
+                      <a:endParaRPr lang="zh-CN" altLang="en-US" dirty="0"/>
+                    </a:p>
+                  </a:txBody>
+                  <a:tcPr/>
+                </a:tc>
+                <a:tc>
+                  <a:txBody>
+                    <a:bodyPr/>
+                    <a:lstStyle/>
+                    <a:p>
+                      <a:r>
+                        <a:rPr lang="en-US" altLang="zh-CN" dirty="0" smtClean="0"/>
+                        <a:t>G</a:t>
+                      </a:r>
+                      <a:endParaRPr lang="zh-CN" altLang="en-US" dirty="0"/>
+                    </a:p>
+                  </a:txBody>
+                  <a:tcPr/>
+                </a:tc>
+                <a:tc>
+                  <a:txBody>
+                    <a:bodyPr/>
+                    <a:lstStyle/>
+                    <a:p>
+                      <a:r>
+                        <a:rPr lang="en-US" altLang="zh-CN" dirty="0" smtClean="0"/>
+                        <a:t>H</a:t>
+                      </a:r>
+                      <a:endParaRPr lang="zh-CN" altLang="en-US" dirty="0"/>
+                    </a:p>
+                  </a:txBody>
+                  <a:tcPr/>
+                </a:tc>
+                <a:tc>
+                  <a:txBody>
+                    <a:bodyPr/>
+                    <a:lstStyle/>
+                    <a:p>
+                      <a:r>
+                        <a:rPr lang="en-US" altLang="zh-CN" dirty="0" smtClean="0"/>
+                        <a:t>I</a:t>
+                      </a:r>
+                      <a:endParaRPr lang="zh-CN" altLang="en-US" dirty="0"/>
+                    </a:p>
+                  </a:txBody>
+                  <a:tcPr/>
+                </a:tc>
+                <a:tc>
+                  <a:txBody>
+                    <a:bodyPr/>
+                    <a:lstStyle/>
+                    <a:p>
+                      <a:r>
+                        <a:rPr lang="en-US" altLang="zh-CN" dirty="0" smtClean="0"/>
+                        <a:t>J</a:t>
+                      </a:r>
+                      <a:endParaRPr lang="zh-CN" altLang="en-US" dirty="0"/>
+                    </a:p>
+                  </a:txBody>
+                  <a:tcPr/>
+                </a:tc>
+                <a:tc>
+                  <a:txBody>
+                    <a:bodyPr/>
+                    <a:lstStyle/>
+                    <a:p>
+                      <a:r>
+                        <a:rPr lang="en-US" altLang="zh-CN" dirty="0" smtClean="0"/>
+                        <a:t>K</a:t>
+                      </a:r>
+                      <a:endParaRPr lang="zh-CN" altLang="en-US" dirty="0"/>
+                    </a:p>
+                  </a:txBody>
+                  <a:tcPr/>
+                </a:tc>
+                <a:tc>
+                  <a:txBody>
+                    <a:bodyPr/>
+                    <a:lstStyle/>
+                    <a:p>
+                      <a:r>
+                        <a:rPr lang="en-US" altLang="zh-CN" dirty="0" smtClean="0"/>
+                        <a:t>L</a:t>
+                      </a:r>
+                      <a:endParaRPr lang="zh-CN" altLang="en-US" dirty="0"/>
+                    </a:p>
+                  </a:txBody>
+                  <a:tcPr/>
+                </a:tc>
+                <a:tc>
+                  <a:txBody>
+                    <a:bodyPr/>
+                    <a:lstStyle/>
+                    <a:p>
+                      <a:r>
+                        <a:rPr lang="en-US" altLang="zh-CN" dirty="0" smtClean="0"/>
+                        <a:t>M</a:t>
+                      </a:r>
+                      <a:endParaRPr lang="zh-CN" altLang="en-US" dirty="0"/>
+                    </a:p>
+                  </a:txBody>
+                  <a:tcPr/>
+                </a:tc>
+                <a:tc>
+                  <a:txBody>
+                    <a:bodyPr/>
+                    <a:lstStyle/>
+                    <a:p>
+                      <a:r>
+                        <a:rPr lang="en-US" altLang="zh-CN" dirty="0" smtClean="0"/>
+                        <a:t>N</a:t>
+                      </a:r>
+                      <a:endParaRPr lang="zh-CN" altLang="en-US" dirty="0"/>
+                    </a:p>
+                  </a:txBody>
+                  <a:tcPr/>
+                </a:tc>
+                <a:tc>
+                  <a:txBody>
+                    <a:bodyPr/>
+                    <a:lstStyle/>
+                    <a:p>
+                      <a:r>
+                        <a:rPr lang="en-US" altLang="zh-CN" dirty="0" smtClean="0"/>
+                        <a:t>O</a:t>
+                      </a:r>
+                      <a:endParaRPr lang="zh-CN" altLang="en-US" dirty="0"/>
+                    </a:p>
+                  </a:txBody>
+                  <a:tcPr/>
+                </a:tc>
+                <a:tc>
+                  <a:txBody>
+                    <a:bodyPr/>
+                    <a:lstStyle/>
+                    <a:p>
+                      <a:r>
+                        <a:rPr lang="en-US" altLang="zh-CN" dirty="0" smtClean="0"/>
+                        <a:t>P</a:t>
+                      </a:r>
+                      <a:endParaRPr lang="zh-CN" altLang="en-US" dirty="0"/>
+                    </a:p>
+                  </a:txBody>
+                  <a:tcPr/>
+                </a:tc>
+                <a:tc>
+                  <a:txBody>
+                    <a:bodyPr/>
+                    <a:lstStyle/>
+                    <a:p>
+                      <a:r>
+                        <a:rPr lang="en-US" altLang="zh-CN" dirty="0" smtClean="0"/>
+                        <a:t>Q</a:t>
+                      </a:r>
+                      <a:endParaRPr lang="zh-CN" altLang="en-US" dirty="0"/>
+                    </a:p>
+                  </a:txBody>
+                  <a:tcPr/>
+                </a:tc>
+                <a:tc>
+                  <a:txBody>
+                    <a:bodyPr/>
+                    <a:lstStyle/>
+                    <a:p>
+                      <a:r>
+                        <a:rPr lang="en-US" altLang="zh-CN" dirty="0" smtClean="0"/>
+                        <a:t>R</a:t>
+                      </a:r>
+                      <a:endParaRPr lang="zh-CN" altLang="en-US" dirty="0"/>
+                    </a:p>
+                  </a:txBody>
+                  <a:tcPr/>
+                </a:tc>
+                <a:tc>
+                  <a:txBody>
+                    <a:bodyPr/>
+                    <a:lstStyle/>
+                    <a:p>
+                      <a:r>
+                        <a:rPr lang="en-US" altLang="zh-CN" dirty="0" smtClean="0"/>
+                        <a:t>S</a:t>
+                      </a:r>
+                      <a:endParaRPr lang="zh-CN" altLang="en-US" dirty="0"/>
+                    </a:p>
+                  </a:txBody>
+                  <a:tcPr/>
+                </a:tc>
+                <a:tc>
+                  <a:txBody>
+                    <a:bodyPr/>
+                    <a:lstStyle/>
+                    <a:p>
+                      <a:r>
+                        <a:rPr lang="en-US" altLang="zh-CN" dirty="0" smtClean="0"/>
+                        <a:t>T</a:t>
+                      </a:r>
+                      <a:endParaRPr lang="zh-CN" altLang="en-US" dirty="0"/>
+                    </a:p>
+                  </a:txBody>
+                  <a:tcPr/>
+                </a:tc>
+                <a:tc>
+                  <a:txBody>
+                    <a:bodyPr/>
+                    <a:lstStyle/>
+                    <a:p>
+                      <a:r>
+                        <a:rPr lang="en-US" altLang="zh-CN" dirty="0" smtClean="0"/>
+                        <a:t>U</a:t>
+                      </a:r>
+                      <a:endParaRPr lang="zh-CN" altLang="en-US" dirty="0"/>
+                    </a:p>
+                  </a:txBody>
+                  <a:tcPr/>
+                </a:tc>
+                <a:tc>
+                  <a:txBody>
+                    <a:bodyPr/>
+                    <a:lstStyle/>
+                    <a:p>
+                      <a:r>
+                        <a:rPr lang="en-US" altLang="zh-CN" dirty="0" smtClean="0"/>
+                        <a:t>V</a:t>
+                      </a:r>
+                      <a:endParaRPr lang="zh-CN" altLang="en-US" dirty="0"/>
+                    </a:p>
+                  </a:txBody>
+                  <a:tcPr/>
+                </a:tc>
+                <a:tc>
+                  <a:txBody>
+                    <a:bodyPr/>
+                    <a:lstStyle/>
+                    <a:p>
+                      <a:r>
+                        <a:rPr lang="en-US" altLang="zh-CN" dirty="0" smtClean="0"/>
+                        <a:t>W</a:t>
+                      </a:r>
+                      <a:endParaRPr lang="zh-CN" altLang="en-US" dirty="0"/>
+                    </a:p>
+                  </a:txBody>
+                  <a:tcPr/>
+                </a:tc>
+                <a:tc>
+                  <a:txBody>
+                    <a:bodyPr/>
+                    <a:lstStyle/>
+                    <a:p>
+                      <a:r>
+                        <a:rPr lang="en-US" altLang="zh-CN" dirty="0" smtClean="0"/>
+                        <a:t>X</a:t>
+                      </a:r>
+                      <a:endParaRPr lang="zh-CN" altLang="en-US" dirty="0"/>
+                    </a:p>
+                  </a:txBody>
+                  <a:tcPr/>
+                </a:tc>
+                <a:tc>
+                  <a:txBody>
+                    <a:bodyPr/>
+                    <a:lstStyle/>
+                    <a:p>
+                      <a:r>
+                        <a:rPr lang="en-US" altLang="zh-CN" dirty="0" smtClean="0"/>
+                        <a:t>Y</a:t>
+                      </a:r>
+                      <a:endParaRPr lang="zh-CN" altLang="en-US" dirty="0"/>
+                    </a:p>
+                  </a:txBody>
+                  <a:tcPr/>
+                </a:tc>
+                <a:tc>
+                  <a:txBody>
+                    <a:bodyPr/>
+                    <a:lstStyle/>
+                    <a:p>
+                      <a:r>
+                        <a:rPr lang="en-US" altLang="zh-CN" dirty="0" smtClean="0"/>
+                        <a:t>Z</a:t>
+                      </a:r>
+                      <a:endParaRPr lang="zh-CN" altLang="en-US" dirty="0"/>
+                    </a:p>
+                  </a:txBody>
+                  <a:tcPr/>
+                </a:tc>
+              </a:tr>
+              <a:tr h="396044">
+                <a:tc>
+                  <a:txBody>
+                    <a:bodyPr/>
+                    <a:lstStyle/>
+                    <a:p>
+                      <a:r>
+                        <a:rPr lang="en-US" altLang="zh-CN" dirty="0" smtClean="0"/>
+                        <a:t>0</a:t>
+                      </a:r>
+                      <a:endParaRPr lang="zh-CN" altLang="en-US" dirty="0"/>
+                    </a:p>
+                  </a:txBody>
+                  <a:tcPr/>
+                </a:tc>
+                <a:tc>
+                  <a:txBody>
+                    <a:bodyPr/>
+                    <a:lstStyle/>
+                    <a:p>
+                      <a:r>
+                        <a:rPr lang="en-US" altLang="zh-CN" dirty="0" smtClean="0"/>
+                        <a:t>1</a:t>
+                      </a:r>
+                      <a:endParaRPr lang="zh-CN" altLang="en-US" dirty="0"/>
+                    </a:p>
+                  </a:txBody>
+                  <a:tcPr/>
+                </a:tc>
+                <a:tc>
+                  <a:txBody>
+                    <a:bodyPr/>
+                    <a:lstStyle/>
+                    <a:p>
+                      <a:r>
+                        <a:rPr lang="en-US" altLang="zh-CN" dirty="0" smtClean="0"/>
+                        <a:t>2</a:t>
+                      </a:r>
+                      <a:endParaRPr lang="zh-CN" altLang="en-US" dirty="0"/>
+                    </a:p>
+                  </a:txBody>
+                  <a:tcPr/>
+                </a:tc>
+                <a:tc>
+                  <a:txBody>
+                    <a:bodyPr/>
+                    <a:lstStyle/>
+                    <a:p>
+                      <a:r>
+                        <a:rPr lang="en-US" altLang="zh-CN" dirty="0" smtClean="0"/>
+                        <a:t>3</a:t>
+                      </a:r>
+                      <a:endParaRPr lang="zh-CN" altLang="en-US" dirty="0"/>
+                    </a:p>
+                  </a:txBody>
+                  <a:tcPr/>
+                </a:tc>
+                <a:tc>
+                  <a:txBody>
+                    <a:bodyPr/>
+                    <a:lstStyle/>
+                    <a:p>
+                      <a:r>
+                        <a:rPr lang="en-US" altLang="zh-CN" dirty="0" smtClean="0"/>
+                        <a:t>4</a:t>
+                      </a:r>
+                      <a:endParaRPr lang="zh-CN" altLang="en-US" dirty="0"/>
+                    </a:p>
+                  </a:txBody>
+                  <a:tcPr/>
+                </a:tc>
+                <a:tc>
+                  <a:txBody>
+                    <a:bodyPr/>
+                    <a:lstStyle/>
+                    <a:p>
+                      <a:r>
+                        <a:rPr lang="en-US" altLang="zh-CN" dirty="0" smtClean="0"/>
+                        <a:t>5</a:t>
+                      </a:r>
+                      <a:endParaRPr lang="zh-CN" altLang="en-US" dirty="0"/>
+                    </a:p>
+                  </a:txBody>
+                  <a:tcPr/>
+                </a:tc>
+                <a:tc>
+                  <a:txBody>
+                    <a:bodyPr/>
+                    <a:lstStyle/>
+                    <a:p>
+                      <a:r>
+                        <a:rPr lang="en-US" altLang="zh-CN" dirty="0" smtClean="0"/>
+                        <a:t>6</a:t>
+                      </a:r>
+                      <a:endParaRPr lang="zh-CN" altLang="en-US" dirty="0"/>
+                    </a:p>
+                  </a:txBody>
+                  <a:tcPr/>
+                </a:tc>
+                <a:tc>
+                  <a:txBody>
+                    <a:bodyPr/>
+                    <a:lstStyle/>
+                    <a:p>
+                      <a:r>
+                        <a:rPr lang="en-US" altLang="zh-CN" dirty="0" smtClean="0"/>
+                        <a:t>7</a:t>
+                      </a:r>
+                      <a:endParaRPr lang="zh-CN" altLang="en-US" dirty="0"/>
+                    </a:p>
+                  </a:txBody>
+                  <a:tcPr/>
+                </a:tc>
+                <a:tc>
+                  <a:txBody>
+                    <a:bodyPr/>
+                    <a:lstStyle/>
+                    <a:p>
+                      <a:r>
+                        <a:rPr lang="en-US" altLang="zh-CN" dirty="0" smtClean="0"/>
+                        <a:t>8</a:t>
+                      </a:r>
+                      <a:endParaRPr lang="zh-CN" altLang="en-US" dirty="0"/>
+                    </a:p>
+                  </a:txBody>
+                  <a:tcPr/>
+                </a:tc>
+                <a:tc>
+                  <a:txBody>
+                    <a:bodyPr/>
+                    <a:lstStyle/>
+                    <a:p>
+                      <a:r>
+                        <a:rPr lang="en-US" altLang="zh-CN" dirty="0" smtClean="0"/>
+                        <a:t>9</a:t>
+                      </a:r>
+                      <a:endParaRPr lang="zh-CN" altLang="en-US" dirty="0"/>
+                    </a:p>
+                  </a:txBody>
+                  <a:tcPr/>
+                </a:tc>
+                <a:tc>
+                  <a:txBody>
+                    <a:bodyPr/>
+                    <a:lstStyle/>
+                    <a:p>
+                      <a:r>
+                        <a:rPr lang="en-US" altLang="zh-CN" dirty="0" smtClean="0"/>
+                        <a:t>10</a:t>
+                      </a:r>
+                      <a:endParaRPr lang="zh-CN" altLang="en-US" dirty="0"/>
+                    </a:p>
+                  </a:txBody>
+                  <a:tcPr/>
+                </a:tc>
+                <a:tc>
+                  <a:txBody>
+                    <a:bodyPr/>
+                    <a:lstStyle/>
+                    <a:p>
+                      <a:r>
+                        <a:rPr lang="en-US" altLang="zh-CN" dirty="0" smtClean="0"/>
+                        <a:t>11</a:t>
+                      </a:r>
+                      <a:endParaRPr lang="zh-CN" altLang="en-US" dirty="0"/>
+                    </a:p>
+                  </a:txBody>
+                  <a:tcPr/>
+                </a:tc>
+                <a:tc>
+                  <a:txBody>
+                    <a:bodyPr/>
+                    <a:lstStyle/>
+                    <a:p>
+                      <a:r>
+                        <a:rPr lang="en-US" altLang="zh-CN" dirty="0" smtClean="0"/>
+                        <a:t>12</a:t>
+                      </a:r>
+                      <a:endParaRPr lang="zh-CN" altLang="en-US" dirty="0"/>
+                    </a:p>
+                  </a:txBody>
+                  <a:tcPr/>
+                </a:tc>
+                <a:tc>
+                  <a:txBody>
+                    <a:bodyPr/>
+                    <a:lstStyle/>
+                    <a:p>
+                      <a:r>
+                        <a:rPr lang="en-US" altLang="zh-CN" dirty="0" smtClean="0"/>
+                        <a:t>13</a:t>
+                      </a:r>
+                      <a:endParaRPr lang="zh-CN" altLang="en-US" dirty="0"/>
+                    </a:p>
+                  </a:txBody>
+                  <a:tcPr/>
+                </a:tc>
+                <a:tc>
+                  <a:txBody>
+                    <a:bodyPr/>
+                    <a:lstStyle/>
+                    <a:p>
+                      <a:r>
+                        <a:rPr lang="en-US" altLang="zh-CN" dirty="0" smtClean="0"/>
+                        <a:t>14</a:t>
+                      </a:r>
+                      <a:endParaRPr lang="zh-CN" altLang="en-US" dirty="0"/>
+                    </a:p>
+                  </a:txBody>
+                  <a:tcPr/>
+                </a:tc>
+                <a:tc>
+                  <a:txBody>
+                    <a:bodyPr/>
+                    <a:lstStyle/>
+                    <a:p>
+                      <a:r>
+                        <a:rPr lang="en-US" altLang="zh-CN" dirty="0" smtClean="0"/>
+                        <a:t>15</a:t>
+                      </a:r>
+                      <a:endParaRPr lang="zh-CN" altLang="en-US" dirty="0"/>
+                    </a:p>
+                  </a:txBody>
+                  <a:tcPr/>
+                </a:tc>
+                <a:tc>
+                  <a:txBody>
+                    <a:bodyPr/>
+                    <a:lstStyle/>
+                    <a:p>
+                      <a:r>
+                        <a:rPr lang="en-US" altLang="zh-CN" dirty="0" smtClean="0"/>
+                        <a:t>16</a:t>
+                      </a:r>
+                      <a:endParaRPr lang="zh-CN" altLang="en-US" dirty="0"/>
+                    </a:p>
+                  </a:txBody>
+                  <a:tcPr/>
+                </a:tc>
+                <a:tc>
+                  <a:txBody>
+                    <a:bodyPr/>
+                    <a:lstStyle/>
+                    <a:p>
+                      <a:r>
+                        <a:rPr lang="en-US" altLang="zh-CN" dirty="0" smtClean="0"/>
+                        <a:t>17</a:t>
+                      </a:r>
+                      <a:endParaRPr lang="zh-CN" altLang="en-US" dirty="0"/>
+                    </a:p>
+                  </a:txBody>
+                  <a:tcPr/>
+                </a:tc>
+                <a:tc>
+                  <a:txBody>
+                    <a:bodyPr/>
+                    <a:lstStyle/>
+                    <a:p>
+                      <a:r>
+                        <a:rPr lang="en-US" altLang="zh-CN" dirty="0" smtClean="0"/>
+                        <a:t>18</a:t>
+                      </a:r>
+                      <a:endParaRPr lang="zh-CN" altLang="en-US" dirty="0"/>
+                    </a:p>
+                  </a:txBody>
+                  <a:tcPr/>
+                </a:tc>
+                <a:tc>
+                  <a:txBody>
+                    <a:bodyPr/>
+                    <a:lstStyle/>
+                    <a:p>
+                      <a:r>
+                        <a:rPr lang="en-US" altLang="zh-CN" dirty="0" smtClean="0"/>
+                        <a:t>19</a:t>
+                      </a:r>
+                      <a:endParaRPr lang="zh-CN" altLang="en-US" dirty="0"/>
+                    </a:p>
+                  </a:txBody>
+                  <a:tcPr/>
+                </a:tc>
+                <a:tc>
+                  <a:txBody>
+                    <a:bodyPr/>
+                    <a:lstStyle/>
+                    <a:p>
+                      <a:r>
+                        <a:rPr lang="en-US" altLang="zh-CN" dirty="0" smtClean="0"/>
+                        <a:t>20</a:t>
+                      </a:r>
+                      <a:endParaRPr lang="zh-CN" altLang="en-US" dirty="0"/>
+                    </a:p>
+                  </a:txBody>
+                  <a:tcPr/>
+                </a:tc>
+                <a:tc>
+                  <a:txBody>
+                    <a:bodyPr/>
+                    <a:lstStyle/>
+                    <a:p>
+                      <a:r>
+                        <a:rPr lang="en-US" altLang="zh-CN" dirty="0" smtClean="0"/>
+                        <a:t>21</a:t>
+                      </a:r>
+                      <a:endParaRPr lang="zh-CN" altLang="en-US" dirty="0"/>
+                    </a:p>
+                  </a:txBody>
+                  <a:tcPr/>
+                </a:tc>
+                <a:tc>
+                  <a:txBody>
+                    <a:bodyPr/>
+                    <a:lstStyle/>
+                    <a:p>
+                      <a:r>
+                        <a:rPr lang="en-US" altLang="zh-CN" dirty="0" smtClean="0"/>
+                        <a:t>22</a:t>
+                      </a:r>
+                      <a:endParaRPr lang="zh-CN" altLang="en-US" dirty="0"/>
+                    </a:p>
+                  </a:txBody>
+                  <a:tcPr/>
+                </a:tc>
+                <a:tc>
+                  <a:txBody>
+                    <a:bodyPr/>
+                    <a:lstStyle/>
+                    <a:p>
+                      <a:r>
+                        <a:rPr lang="en-US" altLang="zh-CN" dirty="0" smtClean="0"/>
+                        <a:t>23</a:t>
+                      </a:r>
+                      <a:endParaRPr lang="zh-CN" altLang="en-US" dirty="0"/>
+                    </a:p>
+                  </a:txBody>
+                  <a:tcPr/>
+                </a:tc>
+                <a:tc>
+                  <a:txBody>
+                    <a:bodyPr/>
+                    <a:lstStyle/>
+                    <a:p>
+                      <a:r>
+                        <a:rPr lang="en-US" altLang="zh-CN" dirty="0" smtClean="0"/>
+                        <a:t>24</a:t>
+                      </a:r>
+                      <a:endParaRPr lang="zh-CN" altLang="en-US" dirty="0"/>
+                    </a:p>
+                  </a:txBody>
+                  <a:tcPr/>
+                </a:tc>
+                <a:tc>
+                  <a:txBody>
+                    <a:bodyPr/>
+                    <a:lstStyle/>
+                    <a:p>
+                      <a:r>
+                        <a:rPr lang="en-US" altLang="zh-CN" dirty="0" smtClean="0"/>
+                        <a:t>25</a:t>
+                      </a:r>
+                      <a:endParaRPr lang="zh-CN" altLang="en-US" dirty="0"/>
+                    </a:p>
+                  </a:txBody>
+                  <a:tcPr/>
+                </a:tc>
+              </a:tr>
+            </a:tbl>
+          </a:graphicData>
+        </a:graphic>
+      </p:graphicFrame>
+      <p:graphicFrame>
+        <p:nvGraphicFramePr>
+          <p:cNvPr id="5" name="表格 4"/>
+          <p:cNvGraphicFramePr>
+            <a:graphicFrameLocks noGrp="1"/>
+          </p:cNvGraphicFramePr>
+          <p:nvPr>
+            <p:extLst>
+              <p:ext uri="{D42A27DB-BD31-4B8C-83A1-F6EECF244321}">
+                <p14:modId xmlns:p14="http://schemas.microsoft.com/office/powerpoint/2010/main" val="2190110697"/>
+              </p:ext>
+            </p:extLst>
+          </p:nvPr>
+        </p:nvGraphicFramePr>
+        <p:xfrm>
+          <a:off x="1485900" y="4005064"/>
+          <a:ext cx="8568952" cy="2743200"/>
+        </p:xfrm>
+        <a:graphic>
+          <a:graphicData uri="http://schemas.openxmlformats.org/drawingml/2006/table">
+            <a:tbl>
+              <a:tblPr firstRow="1" bandRow="1">
+                <a:tableStyleId>{5C22544A-7EE6-4342-B048-85BDC9FD1C3A}</a:tableStyleId>
+              </a:tblPr>
+              <a:tblGrid>
+                <a:gridCol w="4284476"/>
+                <a:gridCol w="4284476"/>
+              </a:tblGrid>
+              <a:tr h="370840">
+                <a:tc>
+                  <a:txBody>
+                    <a:bodyPr/>
+                    <a:lstStyle/>
+                    <a:p>
+                      <a:r>
+                        <a:rPr lang="en-US" altLang="zh-CN" dirty="0" smtClean="0"/>
+                        <a:t>Plaintext</a:t>
+                      </a:r>
+                      <a:endParaRPr lang="zh-CN" altLang="en-US" dirty="0"/>
+                    </a:p>
+                  </a:txBody>
+                  <a:tcPr/>
+                </a:tc>
+                <a:tc>
+                  <a:txBody>
+                    <a:bodyPr/>
+                    <a:lstStyle/>
+                    <a:p>
+                      <a:r>
+                        <a:rPr lang="en-US" altLang="zh-CN" dirty="0" err="1" smtClean="0"/>
+                        <a:t>Ciphertext</a:t>
+                      </a:r>
+                      <a:endParaRPr lang="zh-CN" altLang="en-US" dirty="0"/>
+                    </a:p>
+                  </a:txBody>
+                  <a:tcPr/>
+                </a:tc>
+              </a:tr>
+              <a:tr h="370840">
+                <a:tc>
+                  <a:txBody>
+                    <a:bodyPr/>
+                    <a:lstStyle/>
+                    <a:p>
+                      <a:r>
+                        <a:rPr lang="en-US" altLang="zh-CN" dirty="0" smtClean="0"/>
+                        <a:t>H(7)</a:t>
+                      </a:r>
+                      <a:endParaRPr lang="zh-CN" altLang="en-US" dirty="0"/>
+                    </a:p>
+                  </a:txBody>
+                  <a:tcPr/>
+                </a:tc>
+                <a:tc>
+                  <a:txBody>
+                    <a:bodyPr/>
+                    <a:lstStyle/>
+                    <a:p>
+                      <a:r>
+                        <a:rPr lang="en-US" altLang="zh-CN" dirty="0" smtClean="0"/>
+                        <a:t>A((7+19)-26=0)</a:t>
+                      </a:r>
+                      <a:endParaRPr lang="zh-CN" altLang="en-US" dirty="0"/>
+                    </a:p>
+                  </a:txBody>
+                  <a:tcPr/>
+                </a:tc>
+              </a:tr>
+              <a:tr h="370840">
+                <a:tc>
+                  <a:txBody>
+                    <a:bodyPr/>
+                    <a:lstStyle/>
+                    <a:p>
+                      <a:r>
+                        <a:rPr lang="en-US" altLang="zh-CN" dirty="0" smtClean="0"/>
+                        <a:t>E(4)</a:t>
+                      </a:r>
+                    </a:p>
+                  </a:txBody>
+                  <a:tcPr/>
+                </a:tc>
+                <a:tc>
+                  <a:txBody>
+                    <a:bodyPr/>
+                    <a:lstStyle/>
+                    <a:p>
+                      <a:r>
+                        <a:rPr lang="en-US" altLang="zh-CN" dirty="0" smtClean="0"/>
+                        <a:t>X(4+19=23)</a:t>
+                      </a:r>
+                      <a:endParaRPr lang="zh-CN" altLang="en-US" dirty="0"/>
+                    </a:p>
+                  </a:txBody>
+                  <a:tcPr/>
+                </a:tc>
+              </a:tr>
+              <a:tr h="370840">
+                <a:tc>
+                  <a:txBody>
+                    <a:bodyPr/>
+                    <a:lstStyle/>
+                    <a:p>
+                      <a:r>
+                        <a:rPr lang="en-US" altLang="zh-CN" dirty="0" smtClean="0"/>
+                        <a:t>L(11)</a:t>
+                      </a:r>
+                      <a:endParaRPr lang="zh-CN" altLang="en-US" dirty="0"/>
+                    </a:p>
+                  </a:txBody>
+                  <a:tcPr/>
+                </a:tc>
+                <a:tc>
+                  <a:txBody>
+                    <a:bodyPr/>
+                    <a:lstStyle/>
+                    <a:p>
+                      <a:r>
+                        <a:rPr lang="en-US" altLang="zh-CN" dirty="0" smtClean="0"/>
+                        <a:t>E(11+19-26=4)</a:t>
+                      </a:r>
+                      <a:endParaRPr lang="zh-CN" altLang="en-US" dirty="0"/>
+                    </a:p>
+                  </a:txBody>
+                  <a:tcPr/>
+                </a:tc>
+              </a:tr>
+              <a:tr h="370840">
+                <a:tc>
+                  <a:txBody>
+                    <a:bodyPr/>
+                    <a:lstStyle/>
+                    <a:p>
+                      <a:r>
+                        <a:rPr lang="en-US" altLang="zh-CN" dirty="0" smtClean="0"/>
+                        <a:t>L(11)</a:t>
+                      </a:r>
+                      <a:endParaRPr lang="zh-CN" altLang="en-US" dirty="0"/>
+                    </a:p>
+                  </a:txBody>
+                  <a:tcPr/>
+                </a:tc>
+                <a:tc>
+                  <a:txBody>
+                    <a:bodyPr/>
+                    <a:lstStyle/>
+                    <a:p>
+                      <a:r>
+                        <a:rPr lang="en-US" altLang="zh-CN" dirty="0" smtClean="0"/>
+                        <a:t>E(11+19-26=4)</a:t>
+                      </a:r>
+                      <a:endParaRPr lang="zh-CN" altLang="en-US" dirty="0"/>
+                    </a:p>
+                  </a:txBody>
+                  <a:tcPr/>
+                </a:tc>
+              </a:tr>
+              <a:tr h="370840">
+                <a:tc>
+                  <a:txBody>
+                    <a:bodyPr/>
+                    <a:lstStyle/>
+                    <a:p>
+                      <a:r>
+                        <a:rPr lang="en-US" altLang="zh-CN" dirty="0" smtClean="0"/>
+                        <a:t>O(14)</a:t>
+                      </a:r>
+                      <a:endParaRPr lang="zh-CN" altLang="en-US" dirty="0"/>
+                    </a:p>
+                  </a:txBody>
+                  <a:tcPr/>
+                </a:tc>
+                <a:tc>
+                  <a:txBody>
+                    <a:bodyPr/>
+                    <a:lstStyle/>
+                    <a:p>
+                      <a:r>
+                        <a:rPr lang="en-US" altLang="zh-CN" dirty="0" smtClean="0"/>
+                        <a:t>H(14+19-26=7)</a:t>
+                      </a:r>
+                      <a:endParaRPr lang="zh-CN" altLang="en-US" dirty="0"/>
+                    </a:p>
+                  </a:txBody>
+                  <a:tcPr/>
+                </a:tc>
+              </a:tr>
+            </a:tbl>
+          </a:graphicData>
+        </a:graphic>
+      </p:graphicFrame>
     </p:spTree>
     <p:extLst>
       <p:ext uri="{BB962C8B-B14F-4D97-AF65-F5344CB8AC3E}">
-        <p14:creationId xmlns:p14="http://schemas.microsoft.com/office/powerpoint/2010/main" val="142370167"/>
+        <p14:creationId xmlns:p14="http://schemas.microsoft.com/office/powerpoint/2010/main" val="3840929878"/>
       </p:ext>
     </p:extLst>
   </p:cSld>
   <p:clrMapOvr>
     <a:masterClrMapping/>
   </p:clrMapOvr>
-  <mc:AlternateContent xmlns:mc="http://schemas.openxmlformats.org/markup-compatibility/2006" xmlns:p14="http://schemas.microsoft.com/office/powerpoint/2010/main">
-    <mc:Choice Requires="p14">
+  <mc:AlternateContent xmlns:mc="http://schemas.openxmlformats.org/markup-compatibility/2006">
+    <mc:Choice xmlns:p14="http://schemas.microsoft.com/office/powerpoint/2010/main" Requires="p14">
       <p:transition spd="med" p14:dur="700">
         <p:fade/>
       </p:transition>
     </mc:Choice>
-    <mc:Fallback xmlns="">
+    <mc:Fallback>
       <p:transition spd="med">
         <p:fade/>
       </p:transition>
     </mc:Fallback>
   </mc:AlternateContent>
-  <p:timing>
-    <p:tnLst>
-      <p:par>
-        <p:cTn id="1" dur="indefinite" restart="never" nodeType="tmRoot"/>
-      </p:par>
-    </p:tnLst>
-  </p:timing>
 </p:sld>
 </file>
 
@@ -8321,7 +9671,7 @@
           <a:p>
             <a:r>
               <a:rPr lang="en-US" altLang="zh-CN" dirty="0" smtClean="0"/>
-              <a:t>Homework</a:t>
+              <a:t>Command Line Argument</a:t>
             </a:r>
             <a:endParaRPr lang="zh-CN" altLang="en-US" dirty="0"/>
           </a:p>
@@ -8337,342 +9687,283 @@
             <p:ph idx="1"/>
           </p:nvPr>
         </p:nvSpPr>
-        <p:spPr/>
+        <p:spPr>
+          <a:xfrm>
+            <a:off x="1218039" y="2780928"/>
+            <a:ext cx="10360501" cy="4462272"/>
+          </a:xfrm>
+        </p:spPr>
         <p:txBody>
-          <a:bodyPr>
-            <a:normAutofit fontScale="92500"/>
-          </a:bodyPr>
+          <a:bodyPr/>
           <a:lstStyle/>
           <a:p>
             <a:r>
+              <a:rPr lang="en-US" altLang="zh-CN" dirty="0" err="1" smtClean="0"/>
+              <a:t>argc</a:t>
+            </a:r>
+            <a:r>
               <a:rPr lang="en-US" altLang="zh-CN" dirty="0" smtClean="0"/>
-              <a:t>We’ve already make a program to encrypt message, make another program to decrypt the code text to plaintext , also the program should support command line argument </a:t>
-            </a:r>
-          </a:p>
-          <a:p>
-            <a:r>
-              <a:rPr lang="en-US" altLang="zh-CN" dirty="0"/>
-              <a:t>The </a:t>
+              <a:t>: the </a:t>
+            </a:r>
+            <a:r>
+              <a:rPr lang="en-US" altLang="zh-CN" dirty="0" smtClean="0">
+                <a:solidFill>
+                  <a:srgbClr val="FF0000"/>
+                </a:solidFill>
+              </a:rPr>
+              <a:t>arg</a:t>
             </a:r>
             <a:r>
               <a:rPr lang="en-US" altLang="zh-CN" dirty="0" smtClean="0"/>
-              <a:t>encryption method we just used is called </a:t>
-            </a:r>
-            <a:r>
-              <a:rPr lang="en-US" altLang="zh-CN" dirty="0"/>
-              <a:t>Caesar cipher(</a:t>
-            </a:r>
-            <a:r>
-              <a:rPr lang="en-US" altLang="zh-CN" dirty="0">
-                <a:hlinkClick r:id="rId2"/>
-              </a:rPr>
-              <a:t>http://</a:t>
+              <a:t>ument </a:t>
             </a:r>
             <a:r>
               <a:rPr lang="en-US" altLang="zh-CN" dirty="0" smtClean="0">
-                <a:hlinkClick r:id="rId2"/>
-              </a:rPr>
-              <a:t>en.wikipedia.org/wiki/Caesar_cipher</a:t>
+                <a:solidFill>
+                  <a:srgbClr val="FF0000"/>
+                </a:solidFill>
+              </a:rPr>
+              <a:t>c</a:t>
             </a:r>
             <a:r>
               <a:rPr lang="en-US" altLang="zh-CN" dirty="0" smtClean="0"/>
-              <a:t>), it is old and easy to hack. </a:t>
-            </a:r>
-            <a:r>
-              <a:rPr lang="en-US" altLang="zh-CN" dirty="0"/>
-              <a:t>Think </a:t>
+              <a:t>ount</a:t>
+            </a:r>
+          </a:p>
+          <a:p>
+            <a:r>
+              <a:rPr lang="en-US" altLang="zh-CN" dirty="0" err="1" smtClean="0"/>
+              <a:t>argv</a:t>
             </a:r>
             <a:r>
               <a:rPr lang="en-US" altLang="zh-CN" dirty="0" smtClean="0"/>
-              <a:t>about it, how to hack Caesar cipher? </a:t>
-            </a:r>
-          </a:p>
-          <a:p>
-            <a:r>
-              <a:rPr lang="en-US" altLang="zh-CN" dirty="0"/>
-              <a:t>C</a:t>
+              <a:t>:</a:t>
+            </a:r>
+            <a:r>
+              <a:rPr lang="zh-CN" altLang="en-US" dirty="0"/>
+              <a:t> </a:t>
             </a:r>
             <a:r>
               <a:rPr lang="en-US" altLang="zh-CN" dirty="0" smtClean="0"/>
-              <a:t>aesar cipher is not safe, but another cipher called </a:t>
-            </a:r>
-            <a:r>
-              <a:rPr lang="en-US" altLang="zh-CN" dirty="0" err="1"/>
-              <a:t>Vigenère</a:t>
-            </a:r>
-            <a:r>
-              <a:rPr lang="en-US" altLang="zh-CN" dirty="0"/>
-              <a:t> cipher(</a:t>
-            </a:r>
-            <a:r>
-              <a:rPr lang="en-US" altLang="zh-CN" dirty="0">
-                <a:hlinkClick r:id="rId3"/>
-              </a:rPr>
-              <a:t>http://</a:t>
+              <a:t>a list of the </a:t>
             </a:r>
             <a:r>
               <a:rPr lang="en-US" altLang="zh-CN" dirty="0" smtClean="0">
-                <a:hlinkClick r:id="rId3"/>
-              </a:rPr>
-              <a:t>en.wikipedia.org/wiki/Vigen%C3%A8re_cipher</a:t>
+                <a:solidFill>
+                  <a:srgbClr val="FF0000"/>
+                </a:solidFill>
+              </a:rPr>
+              <a:t>arg</a:t>
             </a:r>
             <a:r>
               <a:rPr lang="en-US" altLang="zh-CN" dirty="0" smtClean="0"/>
-              <a:t>) </a:t>
+              <a:t>ument </a:t>
+            </a:r>
+            <a:r>
+              <a:rPr lang="en-US" altLang="zh-CN" dirty="0" smtClean="0">
+                <a:solidFill>
+                  <a:srgbClr val="FF0000"/>
+                </a:solidFill>
+              </a:rPr>
+              <a:t>v</a:t>
             </a:r>
             <a:r>
               <a:rPr lang="en-US" altLang="zh-CN" dirty="0" smtClean="0"/>
-              <a:t>based on Caesar cipher is </a:t>
-            </a:r>
-            <a:r>
-              <a:rPr lang="en-US" altLang="zh-CN" dirty="0" smtClean="0"/>
-              <a:t>more complex and hard to hack. If you are interested, program it. </a:t>
-            </a:r>
-            <a:endParaRPr lang="en-US" altLang="zh-CN" dirty="0"/>
-          </a:p>
-          <a:p>
-            <a:endParaRPr lang="en-US" altLang="zh-CN" dirty="0"/>
-          </a:p>
-          <a:p>
-            <a:endParaRPr lang="en-US" altLang="zh-CN" dirty="0" smtClean="0"/>
-          </a:p>
-          <a:p>
-            <a:endParaRPr lang="en-US" altLang="zh-CN" dirty="0"/>
+              <a:t>ariables </a:t>
+            </a:r>
+            <a:endParaRPr lang="zh-CN" altLang="en-US" dirty="0"/>
           </a:p>
         </p:txBody>
       </p:sp>
       <p:sp>
         <p:nvSpPr>
-          <p:cNvPr id="4" name="五角星 3"/>
+          <p:cNvPr id="4" name="矩形 3"/>
           <p:cNvSpPr/>
           <p:nvPr/>
         </p:nvSpPr>
         <p:spPr>
           <a:xfrm>
-            <a:off x="1197868" y="1772816"/>
-            <a:ext cx="288032" cy="288032"/>
+            <a:off x="1341884" y="2060848"/>
+            <a:ext cx="3959738" cy="461665"/>
           </a:xfrm>
-          <a:prstGeom prst="star5">
+          <a:prstGeom prst="rect">
             <a:avLst/>
           </a:prstGeom>
+          <a:solidFill>
+            <a:schemeClr val="bg1">
+              <a:lumMod val="85000"/>
+              <a:lumOff val="15000"/>
+            </a:schemeClr>
+          </a:solidFill>
         </p:spPr>
-        <p:style>
-          <a:lnRef idx="1">
-            <a:schemeClr val="accent2"/>
-          </a:lnRef>
-          <a:fillRef idx="2">
-            <a:schemeClr val="accent2"/>
-          </a:fillRef>
-          <a:effectRef idx="1">
-            <a:schemeClr val="accent2"/>
-          </a:effectRef>
-          <a:fontRef idx="minor">
-            <a:schemeClr val="dk1"/>
-          </a:fontRef>
-        </p:style>
         <p:txBody>
-          <a:bodyPr rtlCol="0" anchor="ctr"/>
+          <a:bodyPr wrap="none">
+            <a:spAutoFit/>
+          </a:bodyPr>
           <a:lstStyle/>
           <a:p>
-            <a:pPr algn="ctr"/>
-            <a:endParaRPr lang="zh-CN" altLang="en-US" sz="2800"/>
-          </a:p>
-        </p:txBody>
-      </p:sp>
-      <p:sp>
-        <p:nvSpPr>
-          <p:cNvPr id="5" name="五角星 4"/>
-          <p:cNvSpPr/>
-          <p:nvPr/>
-        </p:nvSpPr>
-        <p:spPr>
-          <a:xfrm>
-            <a:off x="1269876" y="2996952"/>
-            <a:ext cx="288032" cy="288032"/>
-          </a:xfrm>
-          <a:prstGeom prst="star5">
-            <a:avLst/>
-          </a:prstGeom>
-        </p:spPr>
-        <p:style>
-          <a:lnRef idx="1">
-            <a:schemeClr val="accent2"/>
-          </a:lnRef>
-          <a:fillRef idx="2">
-            <a:schemeClr val="accent2"/>
-          </a:fillRef>
-          <a:effectRef idx="1">
-            <a:schemeClr val="accent2"/>
-          </a:effectRef>
-          <a:fontRef idx="minor">
-            <a:schemeClr val="dk1"/>
-          </a:fontRef>
-        </p:style>
-        <p:txBody>
-          <a:bodyPr rtlCol="0" anchor="ctr"/>
-          <a:lstStyle/>
-          <a:p>
-            <a:pPr algn="ctr"/>
-            <a:endParaRPr lang="zh-CN" altLang="en-US" sz="2800"/>
-          </a:p>
-        </p:txBody>
-      </p:sp>
-      <p:sp>
-        <p:nvSpPr>
-          <p:cNvPr id="6" name="五角星 5"/>
-          <p:cNvSpPr/>
-          <p:nvPr/>
-        </p:nvSpPr>
-        <p:spPr>
-          <a:xfrm>
-            <a:off x="888821" y="3000400"/>
-            <a:ext cx="288032" cy="288032"/>
-          </a:xfrm>
-          <a:prstGeom prst="star5">
-            <a:avLst/>
-          </a:prstGeom>
-        </p:spPr>
-        <p:style>
-          <a:lnRef idx="1">
-            <a:schemeClr val="accent2"/>
-          </a:lnRef>
-          <a:fillRef idx="2">
-            <a:schemeClr val="accent2"/>
-          </a:fillRef>
-          <a:effectRef idx="1">
-            <a:schemeClr val="accent2"/>
-          </a:effectRef>
-          <a:fontRef idx="minor">
-            <a:schemeClr val="dk1"/>
-          </a:fontRef>
-        </p:style>
-        <p:txBody>
-          <a:bodyPr rtlCol="0" anchor="ctr"/>
-          <a:lstStyle/>
-          <a:p>
-            <a:pPr algn="ctr"/>
-            <a:endParaRPr lang="zh-CN" altLang="en-US" sz="2800"/>
-          </a:p>
-        </p:txBody>
-      </p:sp>
-      <p:sp>
-        <p:nvSpPr>
-          <p:cNvPr id="7" name="五角星 6"/>
-          <p:cNvSpPr/>
-          <p:nvPr/>
-        </p:nvSpPr>
-        <p:spPr>
-          <a:xfrm>
-            <a:off x="1210374" y="4317224"/>
-            <a:ext cx="288032" cy="288032"/>
-          </a:xfrm>
-          <a:prstGeom prst="star5">
-            <a:avLst/>
-          </a:prstGeom>
-        </p:spPr>
-        <p:style>
-          <a:lnRef idx="1">
-            <a:schemeClr val="accent2"/>
-          </a:lnRef>
-          <a:fillRef idx="2">
-            <a:schemeClr val="accent2"/>
-          </a:fillRef>
-          <a:effectRef idx="1">
-            <a:schemeClr val="accent2"/>
-          </a:effectRef>
-          <a:fontRef idx="minor">
-            <a:schemeClr val="dk1"/>
-          </a:fontRef>
-        </p:style>
-        <p:txBody>
-          <a:bodyPr rtlCol="0" anchor="ctr"/>
-          <a:lstStyle/>
-          <a:p>
-            <a:pPr algn="ctr"/>
-            <a:endParaRPr lang="zh-CN" altLang="en-US" sz="2800"/>
-          </a:p>
-        </p:txBody>
-      </p:sp>
-      <p:sp>
-        <p:nvSpPr>
-          <p:cNvPr id="8" name="五角星 7"/>
-          <p:cNvSpPr/>
-          <p:nvPr/>
-        </p:nvSpPr>
-        <p:spPr>
-          <a:xfrm>
-            <a:off x="782581" y="4320927"/>
-            <a:ext cx="288032" cy="288032"/>
-          </a:xfrm>
-          <a:prstGeom prst="star5">
-            <a:avLst/>
-          </a:prstGeom>
-        </p:spPr>
-        <p:style>
-          <a:lnRef idx="1">
-            <a:schemeClr val="accent2"/>
-          </a:lnRef>
-          <a:fillRef idx="2">
-            <a:schemeClr val="accent2"/>
-          </a:fillRef>
-          <a:effectRef idx="1">
-            <a:schemeClr val="accent2"/>
-          </a:effectRef>
-          <a:fontRef idx="minor">
-            <a:schemeClr val="dk1"/>
-          </a:fontRef>
-        </p:style>
-        <p:txBody>
-          <a:bodyPr rtlCol="0" anchor="ctr"/>
-          <a:lstStyle/>
-          <a:p>
-            <a:pPr algn="ctr"/>
-            <a:endParaRPr lang="zh-CN" altLang="en-US" sz="2800"/>
-          </a:p>
-        </p:txBody>
-      </p:sp>
-      <p:sp>
-        <p:nvSpPr>
-          <p:cNvPr id="9" name="五角星 8"/>
-          <p:cNvSpPr/>
-          <p:nvPr/>
-        </p:nvSpPr>
-        <p:spPr>
-          <a:xfrm>
-            <a:off x="354788" y="4317224"/>
-            <a:ext cx="288032" cy="288032"/>
-          </a:xfrm>
-          <a:prstGeom prst="star5">
-            <a:avLst/>
-          </a:prstGeom>
-        </p:spPr>
-        <p:style>
-          <a:lnRef idx="1">
-            <a:schemeClr val="accent2"/>
-          </a:lnRef>
-          <a:fillRef idx="2">
-            <a:schemeClr val="accent2"/>
-          </a:fillRef>
-          <a:effectRef idx="1">
-            <a:schemeClr val="accent2"/>
-          </a:effectRef>
-          <a:fontRef idx="minor">
-            <a:schemeClr val="dk1"/>
-          </a:fontRef>
-        </p:style>
-        <p:txBody>
-          <a:bodyPr rtlCol="0" anchor="ctr"/>
-          <a:lstStyle/>
-          <a:p>
-            <a:pPr algn="ctr"/>
-            <a:endParaRPr lang="zh-CN" altLang="en-US" sz="2800"/>
+            <a:r>
+              <a:rPr lang="en-US" altLang="zh-CN" dirty="0">
+                <a:solidFill>
+                  <a:srgbClr val="93C763"/>
+                </a:solidFill>
+                <a:highlight>
+                  <a:srgbClr val="22282A"/>
+                </a:highlight>
+              </a:rPr>
+              <a:t>int</a:t>
+            </a:r>
+            <a:r>
+              <a:rPr lang="en-US" altLang="zh-CN" dirty="0">
+                <a:solidFill>
+                  <a:srgbClr val="F1F2F3"/>
+                </a:solidFill>
+                <a:highlight>
+                  <a:srgbClr val="22282A"/>
+                </a:highlight>
+              </a:rPr>
+              <a:t> </a:t>
+            </a:r>
+            <a:r>
+              <a:rPr lang="en-US" altLang="zh-CN" dirty="0">
+                <a:solidFill>
+                  <a:srgbClr val="F3F2F5"/>
+                </a:solidFill>
+                <a:highlight>
+                  <a:srgbClr val="22282A"/>
+                </a:highlight>
+              </a:rPr>
+              <a:t>main</a:t>
+            </a:r>
+            <a:r>
+              <a:rPr lang="en-US" altLang="zh-CN" dirty="0">
+                <a:solidFill>
+                  <a:srgbClr val="E8E2B7"/>
+                </a:solidFill>
+                <a:highlight>
+                  <a:srgbClr val="22282A"/>
+                </a:highlight>
+              </a:rPr>
+              <a:t>(</a:t>
+            </a:r>
+            <a:r>
+              <a:rPr lang="en-US" altLang="zh-CN" dirty="0">
+                <a:solidFill>
+                  <a:srgbClr val="93C763"/>
+                </a:solidFill>
+                <a:highlight>
+                  <a:srgbClr val="22282A"/>
+                </a:highlight>
+              </a:rPr>
+              <a:t>int</a:t>
+            </a:r>
+            <a:r>
+              <a:rPr lang="en-US" altLang="zh-CN" dirty="0">
+                <a:solidFill>
+                  <a:srgbClr val="F1F2F3"/>
+                </a:solidFill>
+                <a:highlight>
+                  <a:srgbClr val="22282A"/>
+                </a:highlight>
+              </a:rPr>
+              <a:t> </a:t>
+            </a:r>
+            <a:r>
+              <a:rPr lang="en-US" altLang="zh-CN" dirty="0" err="1">
+                <a:solidFill>
+                  <a:srgbClr val="F3F2F5"/>
+                </a:solidFill>
+                <a:highlight>
+                  <a:srgbClr val="22282A"/>
+                </a:highlight>
+              </a:rPr>
+              <a:t>argc</a:t>
+            </a:r>
+            <a:r>
+              <a:rPr lang="en-US" altLang="zh-CN" dirty="0">
+                <a:solidFill>
+                  <a:srgbClr val="E8E2B7"/>
+                </a:solidFill>
+                <a:highlight>
+                  <a:srgbClr val="22282A"/>
+                </a:highlight>
+              </a:rPr>
+              <a:t>,</a:t>
+            </a:r>
+            <a:r>
+              <a:rPr lang="en-US" altLang="zh-CN" dirty="0">
+                <a:solidFill>
+                  <a:srgbClr val="F1F2F3"/>
+                </a:solidFill>
+                <a:highlight>
+                  <a:srgbClr val="22282A"/>
+                </a:highlight>
+              </a:rPr>
+              <a:t> </a:t>
+            </a:r>
+            <a:r>
+              <a:rPr lang="en-US" altLang="zh-CN" dirty="0">
+                <a:solidFill>
+                  <a:srgbClr val="93C763"/>
+                </a:solidFill>
+                <a:highlight>
+                  <a:srgbClr val="22282A"/>
+                </a:highlight>
+              </a:rPr>
+              <a:t>char</a:t>
+            </a:r>
+            <a:r>
+              <a:rPr lang="en-US" altLang="zh-CN" dirty="0">
+                <a:solidFill>
+                  <a:srgbClr val="F1F2F3"/>
+                </a:solidFill>
+                <a:highlight>
+                  <a:srgbClr val="22282A"/>
+                </a:highlight>
+              </a:rPr>
+              <a:t> </a:t>
+            </a:r>
+            <a:r>
+              <a:rPr lang="en-US" altLang="zh-CN" dirty="0">
+                <a:solidFill>
+                  <a:srgbClr val="E8E2B7"/>
+                </a:solidFill>
+                <a:highlight>
+                  <a:srgbClr val="22282A"/>
+                </a:highlight>
+              </a:rPr>
+              <a:t>*</a:t>
+            </a:r>
+            <a:r>
+              <a:rPr lang="en-US" altLang="zh-CN" dirty="0" err="1">
+                <a:solidFill>
+                  <a:srgbClr val="F3F2F5"/>
+                </a:solidFill>
+                <a:highlight>
+                  <a:srgbClr val="22282A"/>
+                </a:highlight>
+              </a:rPr>
+              <a:t>argv</a:t>
+            </a:r>
+            <a:r>
+              <a:rPr lang="en-US" altLang="zh-CN" dirty="0">
+                <a:solidFill>
+                  <a:srgbClr val="E8E2B7"/>
+                </a:solidFill>
+                <a:highlight>
+                  <a:srgbClr val="22282A"/>
+                </a:highlight>
+              </a:rPr>
+              <a:t>[])</a:t>
+            </a:r>
+            <a:endParaRPr lang="zh-CN" altLang="en-US" dirty="0"/>
           </a:p>
         </p:txBody>
       </p:sp>
     </p:spTree>
     <p:extLst>
       <p:ext uri="{BB962C8B-B14F-4D97-AF65-F5344CB8AC3E}">
-        <p14:creationId xmlns:p14="http://schemas.microsoft.com/office/powerpoint/2010/main" val="3990256269"/>
+        <p14:creationId xmlns:p14="http://schemas.microsoft.com/office/powerpoint/2010/main" val="3613900083"/>
       </p:ext>
     </p:extLst>
   </p:cSld>

</xml_diff>